<commit_message>
bo sung kien thuc
</commit_message>
<xml_diff>
--- a/Cách upload source code lên GitHub.pptx
+++ b/Cách upload source code lên GitHub.pptx
@@ -20,6 +20,16 @@
     <p:sldId id="268" r:id="rId14"/>
     <p:sldId id="269" r:id="rId15"/>
     <p:sldId id="270" r:id="rId16"/>
+    <p:sldId id="271" r:id="rId17"/>
+    <p:sldId id="272" r:id="rId18"/>
+    <p:sldId id="273" r:id="rId19"/>
+    <p:sldId id="274" r:id="rId20"/>
+    <p:sldId id="275" r:id="rId21"/>
+    <p:sldId id="276" r:id="rId22"/>
+    <p:sldId id="277" r:id="rId23"/>
+    <p:sldId id="278" r:id="rId24"/>
+    <p:sldId id="279" r:id="rId25"/>
+    <p:sldId id="280" r:id="rId26"/>
   </p:sldIdLst>
   <p:sldSz cx="12192000" cy="6858000"/>
   <p:notesSz cx="6858000" cy="9144000"/>
@@ -118,13 +128,18 @@
       </a:defRPr>
     </a:lvl9pPr>
   </p:defaultTextStyle>
+  <p:extLst>
+    <p:ext uri="{EFAFB233-063F-42B5-8137-9DF3F51BA10A}">
+      <p15:sldGuideLst xmlns:p15="http://schemas.microsoft.com/office/powerpoint/2012/main"/>
+    </p:ext>
+  </p:extLst>
 </p:presentation>
 </file>
 
 <file path=ppt/revisionInfo.xml><?xml version="1.0" encoding="utf-8"?>
 <p1510:revInfo xmlns:a="http://schemas.openxmlformats.org/drawingml/2006/main" xmlns:r="http://schemas.openxmlformats.org/officeDocument/2006/relationships" xmlns:p1510="http://schemas.microsoft.com/office/powerpoint/2015/10/main">
   <p1510:revLst>
-    <p1510:client id="{6A27138B-EAA8-4FD6-9529-F695FCCF27CE}" v="10" dt="2023-05-24T10:24:02.305"/>
+    <p1510:client id="{6A27138B-EAA8-4FD6-9529-F695FCCF27CE}" v="16" dt="2023-05-24T10:59:29.248"/>
   </p1510:revLst>
 </p1510:revInfo>
 </file>
@@ -133,8 +148,8 @@
 <pc:chgInfo xmlns:a="http://schemas.openxmlformats.org/drawingml/2006/main" xmlns:r="http://schemas.openxmlformats.org/officeDocument/2006/relationships" xmlns:ac="http://schemas.microsoft.com/office/drawing/2013/main/command" xmlns:pc="http://schemas.microsoft.com/office/powerpoint/2013/main/command">
   <pc:docChgLst>
     <pc:chgData name="Công Nguyễn Chí" userId="46907b2b6c4e2050" providerId="LiveId" clId="{6A27138B-EAA8-4FD6-9529-F695FCCF27CE}"/>
-    <pc:docChg chg="undo custSel addSld delSld modSld addMainMaster delMainMaster">
-      <pc:chgData name="Công Nguyễn Chí" userId="46907b2b6c4e2050" providerId="LiveId" clId="{6A27138B-EAA8-4FD6-9529-F695FCCF27CE}" dt="2023-05-24T10:27:01.095" v="2163" actId="114"/>
+    <pc:docChg chg="undo custSel addSld delSld modSld sldOrd addMainMaster delMainMaster">
+      <pc:chgData name="Công Nguyễn Chí" userId="46907b2b6c4e2050" providerId="LiveId" clId="{6A27138B-EAA8-4FD6-9529-F695FCCF27CE}" dt="2023-05-24T11:01:00.554" v="4460" actId="20577"/>
       <pc:docMkLst>
         <pc:docMk/>
       </pc:docMkLst>
@@ -795,8 +810,8 @@
           </ac:picMkLst>
         </pc:picChg>
       </pc:sldChg>
-      <pc:sldChg chg="delSp modSp add mod">
-        <pc:chgData name="Công Nguyễn Chí" userId="46907b2b6c4e2050" providerId="LiveId" clId="{6A27138B-EAA8-4FD6-9529-F695FCCF27CE}" dt="2023-05-24T10:27:01.095" v="2163" actId="114"/>
+      <pc:sldChg chg="addSp delSp modSp add mod">
+        <pc:chgData name="Công Nguyễn Chí" userId="46907b2b6c4e2050" providerId="LiveId" clId="{6A27138B-EAA8-4FD6-9529-F695FCCF27CE}" dt="2023-05-24T10:29:25.339" v="2187" actId="2085"/>
         <pc:sldMkLst>
           <pc:docMk/>
           <pc:sldMk cId="2735719579" sldId="270"/>
@@ -817,6 +832,14 @@
             <ac:spMk id="4" creationId="{31A73BE9-170F-F106-7F2B-5A3F871D53E7}"/>
           </ac:spMkLst>
         </pc:spChg>
+        <pc:spChg chg="add mod">
+          <ac:chgData name="Công Nguyễn Chí" userId="46907b2b6c4e2050" providerId="LiveId" clId="{6A27138B-EAA8-4FD6-9529-F695FCCF27CE}" dt="2023-05-24T10:29:25.339" v="2187" actId="2085"/>
+          <ac:spMkLst>
+            <pc:docMk/>
+            <pc:sldMk cId="2735719579" sldId="270"/>
+            <ac:spMk id="6" creationId="{57F07E26-3FC3-73A5-D18E-9AAA8D080144}"/>
+          </ac:spMkLst>
+        </pc:spChg>
         <pc:spChg chg="del">
           <ac:chgData name="Công Nguyễn Chí" userId="46907b2b6c4e2050" providerId="LiveId" clId="{6A27138B-EAA8-4FD6-9529-F695FCCF27CE}" dt="2023-05-24T10:25:48.386" v="1967" actId="478"/>
           <ac:spMkLst>
@@ -825,12 +848,482 @@
             <ac:spMk id="8" creationId="{EBC44ADA-17D0-76CD-778C-77DBD257D155}"/>
           </ac:spMkLst>
         </pc:spChg>
+        <pc:picChg chg="add mod">
+          <ac:chgData name="Công Nguyễn Chí" userId="46907b2b6c4e2050" providerId="LiveId" clId="{6A27138B-EAA8-4FD6-9529-F695FCCF27CE}" dt="2023-05-24T10:29:06.162" v="2181" actId="1076"/>
+          <ac:picMkLst>
+            <pc:docMk/>
+            <pc:sldMk cId="2735719579" sldId="270"/>
+            <ac:picMk id="5" creationId="{DA934262-144B-6E66-3C72-D3C2551EB828}"/>
+          </ac:picMkLst>
+        </pc:picChg>
         <pc:picChg chg="del">
           <ac:chgData name="Công Nguyễn Chí" userId="46907b2b6c4e2050" providerId="LiveId" clId="{6A27138B-EAA8-4FD6-9529-F695FCCF27CE}" dt="2023-05-24T10:25:49.046" v="1968" actId="478"/>
           <ac:picMkLst>
             <pc:docMk/>
             <pc:sldMk cId="2735719579" sldId="270"/>
             <ac:picMk id="7" creationId="{FB93C07B-EAB0-B910-D30B-1B0F982FD65D}"/>
+          </ac:picMkLst>
+        </pc:picChg>
+      </pc:sldChg>
+      <pc:sldChg chg="addSp delSp modSp add mod">
+        <pc:chgData name="Công Nguyễn Chí" userId="46907b2b6c4e2050" providerId="LiveId" clId="{6A27138B-EAA8-4FD6-9529-F695FCCF27CE}" dt="2023-05-24T10:33:09.757" v="2464" actId="2085"/>
+        <pc:sldMkLst>
+          <pc:docMk/>
+          <pc:sldMk cId="3779618065" sldId="271"/>
+        </pc:sldMkLst>
+        <pc:spChg chg="mod">
+          <ac:chgData name="Công Nguyễn Chí" userId="46907b2b6c4e2050" providerId="LiveId" clId="{6A27138B-EAA8-4FD6-9529-F695FCCF27CE}" dt="2023-05-24T10:30:00.300" v="2190" actId="20577"/>
+          <ac:spMkLst>
+            <pc:docMk/>
+            <pc:sldMk cId="3779618065" sldId="271"/>
+            <ac:spMk id="2" creationId="{796ACF0C-55FA-5B7A-0AAD-B999FAA6FDFB}"/>
+          </ac:spMkLst>
+        </pc:spChg>
+        <pc:spChg chg="mod">
+          <ac:chgData name="Công Nguyễn Chí" userId="46907b2b6c4e2050" providerId="LiveId" clId="{6A27138B-EAA8-4FD6-9529-F695FCCF27CE}" dt="2023-05-24T10:31:55.819" v="2454" actId="20577"/>
+          <ac:spMkLst>
+            <pc:docMk/>
+            <pc:sldMk cId="3779618065" sldId="271"/>
+            <ac:spMk id="4" creationId="{31A73BE9-170F-F106-7F2B-5A3F871D53E7}"/>
+          </ac:spMkLst>
+        </pc:spChg>
+        <pc:spChg chg="del">
+          <ac:chgData name="Công Nguyễn Chí" userId="46907b2b6c4e2050" providerId="LiveId" clId="{6A27138B-EAA8-4FD6-9529-F695FCCF27CE}" dt="2023-05-24T10:30:03.909" v="2192" actId="478"/>
+          <ac:spMkLst>
+            <pc:docMk/>
+            <pc:sldMk cId="3779618065" sldId="271"/>
+            <ac:spMk id="6" creationId="{57F07E26-3FC3-73A5-D18E-9AAA8D080144}"/>
+          </ac:spMkLst>
+        </pc:spChg>
+        <pc:spChg chg="add mod">
+          <ac:chgData name="Công Nguyễn Chí" userId="46907b2b6c4e2050" providerId="LiveId" clId="{6A27138B-EAA8-4FD6-9529-F695FCCF27CE}" dt="2023-05-24T10:33:09.757" v="2464" actId="2085"/>
+          <ac:spMkLst>
+            <pc:docMk/>
+            <pc:sldMk cId="3779618065" sldId="271"/>
+            <ac:spMk id="8" creationId="{4012BEBA-ECE0-FABA-362E-C0FB20E4AFE6}"/>
+          </ac:spMkLst>
+        </pc:spChg>
+        <pc:picChg chg="del">
+          <ac:chgData name="Công Nguyễn Chí" userId="46907b2b6c4e2050" providerId="LiveId" clId="{6A27138B-EAA8-4FD6-9529-F695FCCF27CE}" dt="2023-05-24T10:30:01.979" v="2191" actId="478"/>
+          <ac:picMkLst>
+            <pc:docMk/>
+            <pc:sldMk cId="3779618065" sldId="271"/>
+            <ac:picMk id="5" creationId="{DA934262-144B-6E66-3C72-D3C2551EB828}"/>
+          </ac:picMkLst>
+        </pc:picChg>
+        <pc:picChg chg="add mod">
+          <ac:chgData name="Công Nguyễn Chí" userId="46907b2b6c4e2050" providerId="LiveId" clId="{6A27138B-EAA8-4FD6-9529-F695FCCF27CE}" dt="2023-05-24T10:32:39.980" v="2460" actId="1582"/>
+          <ac:picMkLst>
+            <pc:docMk/>
+            <pc:sldMk cId="3779618065" sldId="271"/>
+            <ac:picMk id="7" creationId="{60705EC4-687C-C1BA-DFF8-EC729405B8C0}"/>
+          </ac:picMkLst>
+        </pc:picChg>
+      </pc:sldChg>
+      <pc:sldChg chg="addSp delSp modSp add mod">
+        <pc:chgData name="Công Nguyễn Chí" userId="46907b2b6c4e2050" providerId="LiveId" clId="{6A27138B-EAA8-4FD6-9529-F695FCCF27CE}" dt="2023-05-24T10:35:59.125" v="2531" actId="12788"/>
+        <pc:sldMkLst>
+          <pc:docMk/>
+          <pc:sldMk cId="3019429062" sldId="272"/>
+        </pc:sldMkLst>
+        <pc:spChg chg="mod">
+          <ac:chgData name="Công Nguyễn Chí" userId="46907b2b6c4e2050" providerId="LiveId" clId="{6A27138B-EAA8-4FD6-9529-F695FCCF27CE}" dt="2023-05-24T10:34:35.555" v="2467" actId="20577"/>
+          <ac:spMkLst>
+            <pc:docMk/>
+            <pc:sldMk cId="3019429062" sldId="272"/>
+            <ac:spMk id="2" creationId="{796ACF0C-55FA-5B7A-0AAD-B999FAA6FDFB}"/>
+          </ac:spMkLst>
+        </pc:spChg>
+        <pc:spChg chg="mod">
+          <ac:chgData name="Công Nguyễn Chí" userId="46907b2b6c4e2050" providerId="LiveId" clId="{6A27138B-EAA8-4FD6-9529-F695FCCF27CE}" dt="2023-05-24T10:34:55.872" v="2524" actId="20577"/>
+          <ac:spMkLst>
+            <pc:docMk/>
+            <pc:sldMk cId="3019429062" sldId="272"/>
+            <ac:spMk id="4" creationId="{31A73BE9-170F-F106-7F2B-5A3F871D53E7}"/>
+          </ac:spMkLst>
+        </pc:spChg>
+        <pc:spChg chg="del">
+          <ac:chgData name="Công Nguyễn Chí" userId="46907b2b6c4e2050" providerId="LiveId" clId="{6A27138B-EAA8-4FD6-9529-F695FCCF27CE}" dt="2023-05-24T10:35:11.693" v="2526" actId="478"/>
+          <ac:spMkLst>
+            <pc:docMk/>
+            <pc:sldMk cId="3019429062" sldId="272"/>
+            <ac:spMk id="8" creationId="{4012BEBA-ECE0-FABA-362E-C0FB20E4AFE6}"/>
+          </ac:spMkLst>
+        </pc:spChg>
+        <pc:picChg chg="add mod">
+          <ac:chgData name="Công Nguyễn Chí" userId="46907b2b6c4e2050" providerId="LiveId" clId="{6A27138B-EAA8-4FD6-9529-F695FCCF27CE}" dt="2023-05-24T10:35:59.125" v="2531" actId="12788"/>
+          <ac:picMkLst>
+            <pc:docMk/>
+            <pc:sldMk cId="3019429062" sldId="272"/>
+            <ac:picMk id="5" creationId="{282423E6-7F21-926A-FD77-55BE4133843A}"/>
+          </ac:picMkLst>
+        </pc:picChg>
+        <pc:picChg chg="del">
+          <ac:chgData name="Công Nguyễn Chí" userId="46907b2b6c4e2050" providerId="LiveId" clId="{6A27138B-EAA8-4FD6-9529-F695FCCF27CE}" dt="2023-05-24T10:35:09.763" v="2525" actId="478"/>
+          <ac:picMkLst>
+            <pc:docMk/>
+            <pc:sldMk cId="3019429062" sldId="272"/>
+            <ac:picMk id="7" creationId="{60705EC4-687C-C1BA-DFF8-EC729405B8C0}"/>
+          </ac:picMkLst>
+        </pc:picChg>
+      </pc:sldChg>
+      <pc:sldChg chg="addSp delSp modSp add mod">
+        <pc:chgData name="Công Nguyễn Chí" userId="46907b2b6c4e2050" providerId="LiveId" clId="{6A27138B-EAA8-4FD6-9529-F695FCCF27CE}" dt="2023-05-24T10:43:27.456" v="2982" actId="14100"/>
+        <pc:sldMkLst>
+          <pc:docMk/>
+          <pc:sldMk cId="3955449955" sldId="273"/>
+        </pc:sldMkLst>
+        <pc:spChg chg="mod">
+          <ac:chgData name="Công Nguyễn Chí" userId="46907b2b6c4e2050" providerId="LiveId" clId="{6A27138B-EAA8-4FD6-9529-F695FCCF27CE}" dt="2023-05-24T10:36:41.626" v="2544" actId="20577"/>
+          <ac:spMkLst>
+            <pc:docMk/>
+            <pc:sldMk cId="3955449955" sldId="273"/>
+            <ac:spMk id="2" creationId="{796ACF0C-55FA-5B7A-0AAD-B999FAA6FDFB}"/>
+          </ac:spMkLst>
+        </pc:spChg>
+        <pc:spChg chg="add mod">
+          <ac:chgData name="Công Nguyễn Chí" userId="46907b2b6c4e2050" providerId="LiveId" clId="{6A27138B-EAA8-4FD6-9529-F695FCCF27CE}" dt="2023-05-24T10:37:48.047" v="2603" actId="14100"/>
+          <ac:spMkLst>
+            <pc:docMk/>
+            <pc:sldMk cId="3955449955" sldId="273"/>
+            <ac:spMk id="3" creationId="{7E6C1E2F-E987-4A8F-7429-D974CF1D51A8}"/>
+          </ac:spMkLst>
+        </pc:spChg>
+        <pc:spChg chg="mod">
+          <ac:chgData name="Công Nguyễn Chí" userId="46907b2b6c4e2050" providerId="LiveId" clId="{6A27138B-EAA8-4FD6-9529-F695FCCF27CE}" dt="2023-05-24T10:43:23.399" v="2981" actId="20577"/>
+          <ac:spMkLst>
+            <pc:docMk/>
+            <pc:sldMk cId="3955449955" sldId="273"/>
+            <ac:spMk id="4" creationId="{31A73BE9-170F-F106-7F2B-5A3F871D53E7}"/>
+          </ac:spMkLst>
+        </pc:spChg>
+        <pc:spChg chg="add mod">
+          <ac:chgData name="Công Nguyễn Chí" userId="46907b2b6c4e2050" providerId="LiveId" clId="{6A27138B-EAA8-4FD6-9529-F695FCCF27CE}" dt="2023-05-24T10:39:16.597" v="2701" actId="113"/>
+          <ac:spMkLst>
+            <pc:docMk/>
+            <pc:sldMk cId="3955449955" sldId="273"/>
+            <ac:spMk id="6" creationId="{8EC54C98-BB1E-F24A-8F9E-C9A3C0229B0F}"/>
+          </ac:spMkLst>
+        </pc:spChg>
+        <pc:spChg chg="add mod">
+          <ac:chgData name="Công Nguyễn Chí" userId="46907b2b6c4e2050" providerId="LiveId" clId="{6A27138B-EAA8-4FD6-9529-F695FCCF27CE}" dt="2023-05-24T10:43:27.456" v="2982" actId="14100"/>
+          <ac:spMkLst>
+            <pc:docMk/>
+            <pc:sldMk cId="3955449955" sldId="273"/>
+            <ac:spMk id="12" creationId="{A9BD961A-F551-84D7-E196-AAF46D86BB44}"/>
+          </ac:spMkLst>
+        </pc:spChg>
+        <pc:spChg chg="add mod">
+          <ac:chgData name="Công Nguyễn Chí" userId="46907b2b6c4e2050" providerId="LiveId" clId="{6A27138B-EAA8-4FD6-9529-F695FCCF27CE}" dt="2023-05-24T10:42:29.933" v="2969" actId="20577"/>
+          <ac:spMkLst>
+            <pc:docMk/>
+            <pc:sldMk cId="3955449955" sldId="273"/>
+            <ac:spMk id="13" creationId="{468E811C-2B52-F968-BC77-6D2814A6463C}"/>
+          </ac:spMkLst>
+        </pc:spChg>
+        <pc:picChg chg="del">
+          <ac:chgData name="Công Nguyễn Chí" userId="46907b2b6c4e2050" providerId="LiveId" clId="{6A27138B-EAA8-4FD6-9529-F695FCCF27CE}" dt="2023-05-24T10:36:13.261" v="2535" actId="478"/>
+          <ac:picMkLst>
+            <pc:docMk/>
+            <pc:sldMk cId="3955449955" sldId="273"/>
+            <ac:picMk id="5" creationId="{282423E6-7F21-926A-FD77-55BE4133843A}"/>
+          </ac:picMkLst>
+        </pc:picChg>
+        <pc:cxnChg chg="add mod">
+          <ac:chgData name="Công Nguyễn Chí" userId="46907b2b6c4e2050" providerId="LiveId" clId="{6A27138B-EAA8-4FD6-9529-F695FCCF27CE}" dt="2023-05-24T10:38:56.077" v="2698" actId="14100"/>
+          <ac:cxnSpMkLst>
+            <pc:docMk/>
+            <pc:sldMk cId="3955449955" sldId="273"/>
+            <ac:cxnSpMk id="8" creationId="{7178281C-5CC8-D83D-F1D4-B526A91FD9E8}"/>
+          </ac:cxnSpMkLst>
+        </pc:cxnChg>
+        <pc:cxnChg chg="add del mod">
+          <ac:chgData name="Công Nguyễn Chí" userId="46907b2b6c4e2050" providerId="LiveId" clId="{6A27138B-EAA8-4FD6-9529-F695FCCF27CE}" dt="2023-05-24T10:41:30.844" v="2850" actId="478"/>
+          <ac:cxnSpMkLst>
+            <pc:docMk/>
+            <pc:sldMk cId="3955449955" sldId="273"/>
+            <ac:cxnSpMk id="14" creationId="{E7ACFD95-E879-DD3E-62BB-F3DA19CD493E}"/>
+          </ac:cxnSpMkLst>
+        </pc:cxnChg>
+        <pc:cxnChg chg="add mod">
+          <ac:chgData name="Công Nguyễn Chí" userId="46907b2b6c4e2050" providerId="LiveId" clId="{6A27138B-EAA8-4FD6-9529-F695FCCF27CE}" dt="2023-05-24T10:43:27.456" v="2982" actId="14100"/>
+          <ac:cxnSpMkLst>
+            <pc:docMk/>
+            <pc:sldMk cId="3955449955" sldId="273"/>
+            <ac:cxnSpMk id="18" creationId="{DD3397D4-4C77-DBEA-F3B4-30F0E3851DAB}"/>
+          </ac:cxnSpMkLst>
+        </pc:cxnChg>
+      </pc:sldChg>
+      <pc:sldChg chg="addSp delSp modSp add mod">
+        <pc:chgData name="Công Nguyễn Chí" userId="46907b2b6c4e2050" providerId="LiveId" clId="{6A27138B-EAA8-4FD6-9529-F695FCCF27CE}" dt="2023-05-24T10:45:26.302" v="3047" actId="12788"/>
+        <pc:sldMkLst>
+          <pc:docMk/>
+          <pc:sldMk cId="3703750637" sldId="274"/>
+        </pc:sldMkLst>
+        <pc:spChg chg="del">
+          <ac:chgData name="Công Nguyễn Chí" userId="46907b2b6c4e2050" providerId="LiveId" clId="{6A27138B-EAA8-4FD6-9529-F695FCCF27CE}" dt="2023-05-24T10:42:56.929" v="2977" actId="478"/>
+          <ac:spMkLst>
+            <pc:docMk/>
+            <pc:sldMk cId="3703750637" sldId="274"/>
+            <ac:spMk id="3" creationId="{7E6C1E2F-E987-4A8F-7429-D974CF1D51A8}"/>
+          </ac:spMkLst>
+        </pc:spChg>
+        <pc:spChg chg="del mod">
+          <ac:chgData name="Công Nguyễn Chí" userId="46907b2b6c4e2050" providerId="LiveId" clId="{6A27138B-EAA8-4FD6-9529-F695FCCF27CE}" dt="2023-05-24T10:45:00.112" v="2983" actId="22"/>
+          <ac:spMkLst>
+            <pc:docMk/>
+            <pc:sldMk cId="3703750637" sldId="274"/>
+            <ac:spMk id="4" creationId="{31A73BE9-170F-F106-7F2B-5A3F871D53E7}"/>
+          </ac:spMkLst>
+        </pc:spChg>
+        <pc:spChg chg="del">
+          <ac:chgData name="Công Nguyễn Chí" userId="46907b2b6c4e2050" providerId="LiveId" clId="{6A27138B-EAA8-4FD6-9529-F695FCCF27CE}" dt="2023-05-24T10:42:54.732" v="2975" actId="478"/>
+          <ac:spMkLst>
+            <pc:docMk/>
+            <pc:sldMk cId="3703750637" sldId="274"/>
+            <ac:spMk id="6" creationId="{8EC54C98-BB1E-F24A-8F9E-C9A3C0229B0F}"/>
+          </ac:spMkLst>
+        </pc:spChg>
+        <pc:spChg chg="add mod">
+          <ac:chgData name="Công Nguyễn Chí" userId="46907b2b6c4e2050" providerId="LiveId" clId="{6A27138B-EAA8-4FD6-9529-F695FCCF27CE}" dt="2023-05-24T10:45:26.302" v="3047" actId="12788"/>
+          <ac:spMkLst>
+            <pc:docMk/>
+            <pc:sldMk cId="3703750637" sldId="274"/>
+            <ac:spMk id="9" creationId="{708C0A72-18B1-406F-1996-99C5A1411101}"/>
+          </ac:spMkLst>
+        </pc:spChg>
+        <pc:spChg chg="del">
+          <ac:chgData name="Công Nguyễn Chí" userId="46907b2b6c4e2050" providerId="LiveId" clId="{6A27138B-EAA8-4FD6-9529-F695FCCF27CE}" dt="2023-05-24T10:42:51.453" v="2972" actId="478"/>
+          <ac:spMkLst>
+            <pc:docMk/>
+            <pc:sldMk cId="3703750637" sldId="274"/>
+            <ac:spMk id="12" creationId="{A9BD961A-F551-84D7-E196-AAF46D86BB44}"/>
+          </ac:spMkLst>
+        </pc:spChg>
+        <pc:spChg chg="del">
+          <ac:chgData name="Công Nguyễn Chí" userId="46907b2b6c4e2050" providerId="LiveId" clId="{6A27138B-EAA8-4FD6-9529-F695FCCF27CE}" dt="2023-05-24T10:42:53.478" v="2974" actId="478"/>
+          <ac:spMkLst>
+            <pc:docMk/>
+            <pc:sldMk cId="3703750637" sldId="274"/>
+            <ac:spMk id="13" creationId="{468E811C-2B52-F968-BC77-6D2814A6463C}"/>
+          </ac:spMkLst>
+        </pc:spChg>
+        <pc:picChg chg="add mod ord">
+          <ac:chgData name="Công Nguyễn Chí" userId="46907b2b6c4e2050" providerId="LiveId" clId="{6A27138B-EAA8-4FD6-9529-F695FCCF27CE}" dt="2023-05-24T10:45:04.725" v="2984" actId="12788"/>
+          <ac:picMkLst>
+            <pc:docMk/>
+            <pc:sldMk cId="3703750637" sldId="274"/>
+            <ac:picMk id="7" creationId="{7F510936-65CD-3DFC-654B-9FE86969145C}"/>
+          </ac:picMkLst>
+        </pc:picChg>
+        <pc:cxnChg chg="del">
+          <ac:chgData name="Công Nguyễn Chí" userId="46907b2b6c4e2050" providerId="LiveId" clId="{6A27138B-EAA8-4FD6-9529-F695FCCF27CE}" dt="2023-05-24T10:42:55.250" v="2976" actId="478"/>
+          <ac:cxnSpMkLst>
+            <pc:docMk/>
+            <pc:sldMk cId="3703750637" sldId="274"/>
+            <ac:cxnSpMk id="8" creationId="{7178281C-5CC8-D83D-F1D4-B526A91FD9E8}"/>
+          </ac:cxnSpMkLst>
+        </pc:cxnChg>
+        <pc:cxnChg chg="del mod">
+          <ac:chgData name="Công Nguyễn Chí" userId="46907b2b6c4e2050" providerId="LiveId" clId="{6A27138B-EAA8-4FD6-9529-F695FCCF27CE}" dt="2023-05-24T10:42:52.347" v="2973" actId="478"/>
+          <ac:cxnSpMkLst>
+            <pc:docMk/>
+            <pc:sldMk cId="3703750637" sldId="274"/>
+            <ac:cxnSpMk id="18" creationId="{DD3397D4-4C77-DBEA-F3B4-30F0E3851DAB}"/>
+          </ac:cxnSpMkLst>
+        </pc:cxnChg>
+      </pc:sldChg>
+      <pc:sldChg chg="addSp delSp modSp add mod">
+        <pc:chgData name="Công Nguyễn Chí" userId="46907b2b6c4e2050" providerId="LiveId" clId="{6A27138B-EAA8-4FD6-9529-F695FCCF27CE}" dt="2023-05-24T10:48:31.744" v="3383" actId="948"/>
+        <pc:sldMkLst>
+          <pc:docMk/>
+          <pc:sldMk cId="4160710409" sldId="275"/>
+        </pc:sldMkLst>
+        <pc:spChg chg="mod">
+          <ac:chgData name="Công Nguyễn Chí" userId="46907b2b6c4e2050" providerId="LiveId" clId="{6A27138B-EAA8-4FD6-9529-F695FCCF27CE}" dt="2023-05-24T10:46:16.563" v="3054" actId="20577"/>
+          <ac:spMkLst>
+            <pc:docMk/>
+            <pc:sldMk cId="4160710409" sldId="275"/>
+            <ac:spMk id="2" creationId="{796ACF0C-55FA-5B7A-0AAD-B999FAA6FDFB}"/>
+          </ac:spMkLst>
+        </pc:spChg>
+        <pc:spChg chg="add mod">
+          <ac:chgData name="Công Nguyễn Chí" userId="46907b2b6c4e2050" providerId="LiveId" clId="{6A27138B-EAA8-4FD6-9529-F695FCCF27CE}" dt="2023-05-24T10:48:31.744" v="3383" actId="948"/>
+          <ac:spMkLst>
+            <pc:docMk/>
+            <pc:sldMk cId="4160710409" sldId="275"/>
+            <ac:spMk id="4" creationId="{6BF57A7B-6BFA-2083-96CA-1020B8B5A568}"/>
+          </ac:spMkLst>
+        </pc:spChg>
+        <pc:spChg chg="del">
+          <ac:chgData name="Công Nguyễn Chí" userId="46907b2b6c4e2050" providerId="LiveId" clId="{6A27138B-EAA8-4FD6-9529-F695FCCF27CE}" dt="2023-05-24T10:46:12.842" v="3050" actId="478"/>
+          <ac:spMkLst>
+            <pc:docMk/>
+            <pc:sldMk cId="4160710409" sldId="275"/>
+            <ac:spMk id="9" creationId="{708C0A72-18B1-406F-1996-99C5A1411101}"/>
+          </ac:spMkLst>
+        </pc:spChg>
+        <pc:picChg chg="del">
+          <ac:chgData name="Công Nguyễn Chí" userId="46907b2b6c4e2050" providerId="LiveId" clId="{6A27138B-EAA8-4FD6-9529-F695FCCF27CE}" dt="2023-05-24T10:46:10.157" v="3049" actId="478"/>
+          <ac:picMkLst>
+            <pc:docMk/>
+            <pc:sldMk cId="4160710409" sldId="275"/>
+            <ac:picMk id="7" creationId="{7F510936-65CD-3DFC-654B-9FE86969145C}"/>
+          </ac:picMkLst>
+        </pc:picChg>
+      </pc:sldChg>
+      <pc:sldChg chg="modSp add mod">
+        <pc:chgData name="Công Nguyễn Chí" userId="46907b2b6c4e2050" providerId="LiveId" clId="{6A27138B-EAA8-4FD6-9529-F695FCCF27CE}" dt="2023-05-24T10:52:14.939" v="3788" actId="113"/>
+        <pc:sldMkLst>
+          <pc:docMk/>
+          <pc:sldMk cId="3058747272" sldId="276"/>
+        </pc:sldMkLst>
+        <pc:spChg chg="mod">
+          <ac:chgData name="Công Nguyễn Chí" userId="46907b2b6c4e2050" providerId="LiveId" clId="{6A27138B-EAA8-4FD6-9529-F695FCCF27CE}" dt="2023-05-24T10:52:14.939" v="3788" actId="113"/>
+          <ac:spMkLst>
+            <pc:docMk/>
+            <pc:sldMk cId="3058747272" sldId="276"/>
+            <ac:spMk id="4" creationId="{6BF57A7B-6BFA-2083-96CA-1020B8B5A568}"/>
+          </ac:spMkLst>
+        </pc:spChg>
+      </pc:sldChg>
+      <pc:sldChg chg="modSp add mod">
+        <pc:chgData name="Công Nguyễn Chí" userId="46907b2b6c4e2050" providerId="LiveId" clId="{6A27138B-EAA8-4FD6-9529-F695FCCF27CE}" dt="2023-05-24T10:53:00.071" v="3888" actId="20577"/>
+        <pc:sldMkLst>
+          <pc:docMk/>
+          <pc:sldMk cId="4109226314" sldId="277"/>
+        </pc:sldMkLst>
+        <pc:spChg chg="mod">
+          <ac:chgData name="Công Nguyễn Chí" userId="46907b2b6c4e2050" providerId="LiveId" clId="{6A27138B-EAA8-4FD6-9529-F695FCCF27CE}" dt="2023-05-24T10:53:00.071" v="3888" actId="20577"/>
+          <ac:spMkLst>
+            <pc:docMk/>
+            <pc:sldMk cId="4109226314" sldId="277"/>
+            <ac:spMk id="4" creationId="{6BF57A7B-6BFA-2083-96CA-1020B8B5A568}"/>
+          </ac:spMkLst>
+        </pc:spChg>
+      </pc:sldChg>
+      <pc:sldChg chg="modSp add mod ord">
+        <pc:chgData name="Công Nguyễn Chí" userId="46907b2b6c4e2050" providerId="LiveId" clId="{6A27138B-EAA8-4FD6-9529-F695FCCF27CE}" dt="2023-05-24T10:55:10.125" v="4116" actId="20577"/>
+        <pc:sldMkLst>
+          <pc:docMk/>
+          <pc:sldMk cId="1470272621" sldId="278"/>
+        </pc:sldMkLst>
+        <pc:spChg chg="mod">
+          <ac:chgData name="Công Nguyễn Chí" userId="46907b2b6c4e2050" providerId="LiveId" clId="{6A27138B-EAA8-4FD6-9529-F695FCCF27CE}" dt="2023-05-24T10:53:15.411" v="3893" actId="20577"/>
+          <ac:spMkLst>
+            <pc:docMk/>
+            <pc:sldMk cId="1470272621" sldId="278"/>
+            <ac:spMk id="2" creationId="{796ACF0C-55FA-5B7A-0AAD-B999FAA6FDFB}"/>
+          </ac:spMkLst>
+        </pc:spChg>
+        <pc:spChg chg="mod">
+          <ac:chgData name="Công Nguyễn Chí" userId="46907b2b6c4e2050" providerId="LiveId" clId="{6A27138B-EAA8-4FD6-9529-F695FCCF27CE}" dt="2023-05-24T10:55:10.125" v="4116" actId="20577"/>
+          <ac:spMkLst>
+            <pc:docMk/>
+            <pc:sldMk cId="1470272621" sldId="278"/>
+            <ac:spMk id="4" creationId="{6BF57A7B-6BFA-2083-96CA-1020B8B5A568}"/>
+          </ac:spMkLst>
+        </pc:spChg>
+      </pc:sldChg>
+      <pc:sldChg chg="addSp delSp modSp add mod">
+        <pc:chgData name="Công Nguyễn Chí" userId="46907b2b6c4e2050" providerId="LiveId" clId="{6A27138B-EAA8-4FD6-9529-F695FCCF27CE}" dt="2023-05-24T10:57:34.302" v="4253" actId="12788"/>
+        <pc:sldMkLst>
+          <pc:docMk/>
+          <pc:sldMk cId="2247629520" sldId="279"/>
+        </pc:sldMkLst>
+        <pc:spChg chg="mod">
+          <ac:chgData name="Công Nguyễn Chí" userId="46907b2b6c4e2050" providerId="LiveId" clId="{6A27138B-EAA8-4FD6-9529-F695FCCF27CE}" dt="2023-05-24T10:56:05.712" v="4120" actId="20577"/>
+          <ac:spMkLst>
+            <pc:docMk/>
+            <pc:sldMk cId="2247629520" sldId="279"/>
+            <ac:spMk id="2" creationId="{796ACF0C-55FA-5B7A-0AAD-B999FAA6FDFB}"/>
+          </ac:spMkLst>
+        </pc:spChg>
+        <pc:spChg chg="del mod">
+          <ac:chgData name="Công Nguyễn Chí" userId="46907b2b6c4e2050" providerId="LiveId" clId="{6A27138B-EAA8-4FD6-9529-F695FCCF27CE}" dt="2023-05-24T10:56:07.345" v="4121" actId="22"/>
+          <ac:spMkLst>
+            <pc:docMk/>
+            <pc:sldMk cId="2247629520" sldId="279"/>
+            <ac:spMk id="4" creationId="{6BF57A7B-6BFA-2083-96CA-1020B8B5A568}"/>
+          </ac:spMkLst>
+        </pc:spChg>
+        <pc:spChg chg="add mod">
+          <ac:chgData name="Công Nguyễn Chí" userId="46907b2b6c4e2050" providerId="LiveId" clId="{6A27138B-EAA8-4FD6-9529-F695FCCF27CE}" dt="2023-05-24T10:57:34.302" v="4253" actId="12788"/>
+          <ac:spMkLst>
+            <pc:docMk/>
+            <pc:sldMk cId="2247629520" sldId="279"/>
+            <ac:spMk id="6" creationId="{622C70FA-E388-7F8F-B87D-6244D5C902FA}"/>
+          </ac:spMkLst>
+        </pc:spChg>
+        <pc:picChg chg="add mod ord">
+          <ac:chgData name="Công Nguyễn Chí" userId="46907b2b6c4e2050" providerId="LiveId" clId="{6A27138B-EAA8-4FD6-9529-F695FCCF27CE}" dt="2023-05-24T10:57:22.829" v="4251" actId="12788"/>
+          <ac:picMkLst>
+            <pc:docMk/>
+            <pc:sldMk cId="2247629520" sldId="279"/>
+            <ac:picMk id="5" creationId="{8EE9D4C0-250E-D6D8-88EA-DFAFCD6A355B}"/>
+          </ac:picMkLst>
+        </pc:picChg>
+      </pc:sldChg>
+      <pc:sldChg chg="addSp delSp modSp add mod">
+        <pc:chgData name="Công Nguyễn Chí" userId="46907b2b6c4e2050" providerId="LiveId" clId="{6A27138B-EAA8-4FD6-9529-F695FCCF27CE}" dt="2023-05-24T11:01:00.554" v="4460" actId="20577"/>
+        <pc:sldMkLst>
+          <pc:docMk/>
+          <pc:sldMk cId="2781538849" sldId="280"/>
+        </pc:sldMkLst>
+        <pc:spChg chg="mod">
+          <ac:chgData name="Công Nguyễn Chí" userId="46907b2b6c4e2050" providerId="LiveId" clId="{6A27138B-EAA8-4FD6-9529-F695FCCF27CE}" dt="2023-05-24T11:01:00.554" v="4460" actId="20577"/>
+          <ac:spMkLst>
+            <pc:docMk/>
+            <pc:sldMk cId="2781538849" sldId="280"/>
+            <ac:spMk id="2" creationId="{796ACF0C-55FA-5B7A-0AAD-B999FAA6FDFB}"/>
+          </ac:spMkLst>
+        </pc:spChg>
+        <pc:spChg chg="add del mod">
+          <ac:chgData name="Công Nguyễn Chí" userId="46907b2b6c4e2050" providerId="LiveId" clId="{6A27138B-EAA8-4FD6-9529-F695FCCF27CE}" dt="2023-05-24T10:58:15.705" v="4256" actId="22"/>
+          <ac:spMkLst>
+            <pc:docMk/>
+            <pc:sldMk cId="2781538849" sldId="280"/>
+            <ac:spMk id="4" creationId="{A7A804DF-8A78-622D-8F10-4F9FB6CADACB}"/>
+          </ac:spMkLst>
+        </pc:spChg>
+        <pc:spChg chg="mod">
+          <ac:chgData name="Công Nguyễn Chí" userId="46907b2b6c4e2050" providerId="LiveId" clId="{6A27138B-EAA8-4FD6-9529-F695FCCF27CE}" dt="2023-05-24T10:59:17.713" v="4357" actId="20577"/>
+          <ac:spMkLst>
+            <pc:docMk/>
+            <pc:sldMk cId="2781538849" sldId="280"/>
+            <ac:spMk id="6" creationId="{622C70FA-E388-7F8F-B87D-6244D5C902FA}"/>
+          </ac:spMkLst>
+        </pc:spChg>
+        <pc:spChg chg="add mod">
+          <ac:chgData name="Công Nguyễn Chí" userId="46907b2b6c4e2050" providerId="LiveId" clId="{6A27138B-EAA8-4FD6-9529-F695FCCF27CE}" dt="2023-05-24T10:59:53.984" v="4446" actId="14100"/>
+          <ac:spMkLst>
+            <pc:docMk/>
+            <pc:sldMk cId="2781538849" sldId="280"/>
+            <ac:spMk id="9" creationId="{9DB39DBE-DA3C-8E52-E029-1FF67E0CF9A4}"/>
+          </ac:spMkLst>
+        </pc:spChg>
+        <pc:spChg chg="add mod">
+          <ac:chgData name="Công Nguyễn Chí" userId="46907b2b6c4e2050" providerId="LiveId" clId="{6A27138B-EAA8-4FD6-9529-F695FCCF27CE}" dt="2023-05-24T11:00:46.192" v="4458" actId="2085"/>
+          <ac:spMkLst>
+            <pc:docMk/>
+            <pc:sldMk cId="2781538849" sldId="280"/>
+            <ac:spMk id="10" creationId="{FFF797E7-E3E9-DEE3-0267-93FA6BF94242}"/>
+          </ac:spMkLst>
+        </pc:spChg>
+        <pc:picChg chg="del">
+          <ac:chgData name="Công Nguyễn Chí" userId="46907b2b6c4e2050" providerId="LiveId" clId="{6A27138B-EAA8-4FD6-9529-F695FCCF27CE}" dt="2023-05-24T10:57:45.746" v="4255" actId="478"/>
+          <ac:picMkLst>
+            <pc:docMk/>
+            <pc:sldMk cId="2781538849" sldId="280"/>
+            <ac:picMk id="5" creationId="{8EE9D4C0-250E-D6D8-88EA-DFAFCD6A355B}"/>
+          </ac:picMkLst>
+        </pc:picChg>
+        <pc:picChg chg="add mod ord">
+          <ac:chgData name="Công Nguyễn Chí" userId="46907b2b6c4e2050" providerId="LiveId" clId="{6A27138B-EAA8-4FD6-9529-F695FCCF27CE}" dt="2023-05-24T10:58:29.965" v="4262" actId="1582"/>
+          <ac:picMkLst>
+            <pc:docMk/>
+            <pc:sldMk cId="2781538849" sldId="280"/>
+            <ac:picMk id="8" creationId="{EFBE0DDF-AED9-923E-03D4-46725E1D43E8}"/>
           </ac:picMkLst>
         </pc:picChg>
       </pc:sldChg>
@@ -8605,10 +9098,1146 @@
           </a:p>
         </p:txBody>
       </p:sp>
+      <p:pic>
+        <p:nvPicPr>
+          <p:cNvPr id="5" name="Picture 4">
+            <a:extLst>
+              <a:ext uri="{FF2B5EF4-FFF2-40B4-BE49-F238E27FC236}">
+                <a16:creationId xmlns:a16="http://schemas.microsoft.com/office/drawing/2014/main" id="{DA934262-144B-6E66-3C72-D3C2551EB828}"/>
+              </a:ext>
+            </a:extLst>
+          </p:cNvPr>
+          <p:cNvPicPr>
+            <a:picLocks noChangeAspect="1"/>
+          </p:cNvPicPr>
+          <p:nvPr/>
+        </p:nvPicPr>
+        <p:blipFill>
+          <a:blip r:embed="rId2"/>
+          <a:stretch>
+            <a:fillRect/>
+          </a:stretch>
+        </p:blipFill>
+        <p:spPr>
+          <a:xfrm>
+            <a:off x="2870611" y="3160456"/>
+            <a:ext cx="6110203" cy="3436989"/>
+          </a:xfrm>
+          <a:prstGeom prst="rect">
+            <a:avLst/>
+          </a:prstGeom>
+          <a:ln w="28575" cap="sq">
+            <a:solidFill>
+              <a:srgbClr val="00B050"/>
+            </a:solidFill>
+            <a:miter lim="800000"/>
+          </a:ln>
+          <a:effectLst>
+            <a:outerShdw blurRad="57150" dist="50800" dir="2700000" algn="tl" rotWithShape="0">
+              <a:srgbClr val="000000">
+                <a:alpha val="40000"/>
+              </a:srgbClr>
+            </a:outerShdw>
+          </a:effectLst>
+        </p:spPr>
+      </p:pic>
+      <p:sp>
+        <p:nvSpPr>
+          <p:cNvPr id="6" name="Arrow: Down 5">
+            <a:extLst>
+              <a:ext uri="{FF2B5EF4-FFF2-40B4-BE49-F238E27FC236}">
+                <a16:creationId xmlns:a16="http://schemas.microsoft.com/office/drawing/2014/main" id="{57F07E26-3FC3-73A5-D18E-9AAA8D080144}"/>
+              </a:ext>
+            </a:extLst>
+          </p:cNvPr>
+          <p:cNvSpPr/>
+          <p:nvPr/>
+        </p:nvSpPr>
+        <p:spPr>
+          <a:xfrm rot="6892487">
+            <a:off x="6400803" y="3935054"/>
+            <a:ext cx="275303" cy="1553496"/>
+          </a:xfrm>
+          <a:prstGeom prst="downArrow">
+            <a:avLst/>
+          </a:prstGeom>
+          <a:solidFill>
+            <a:srgbClr val="FF0000"/>
+          </a:solidFill>
+          <a:ln>
+            <a:noFill/>
+          </a:ln>
+        </p:spPr>
+        <p:style>
+          <a:lnRef idx="2">
+            <a:schemeClr val="accent1">
+              <a:shade val="50000"/>
+            </a:schemeClr>
+          </a:lnRef>
+          <a:fillRef idx="1">
+            <a:schemeClr val="accent1"/>
+          </a:fillRef>
+          <a:effectRef idx="0">
+            <a:schemeClr val="accent1"/>
+          </a:effectRef>
+          <a:fontRef idx="minor">
+            <a:schemeClr val="lt1"/>
+          </a:fontRef>
+        </p:style>
+        <p:txBody>
+          <a:bodyPr rtlCol="0" anchor="ctr"/>
+          <a:lstStyle/>
+          <a:p>
+            <a:pPr algn="ctr"/>
+            <a:endParaRPr lang="vi-VN"/>
+          </a:p>
+        </p:txBody>
+      </p:sp>
     </p:spTree>
     <p:extLst>
       <p:ext uri="{BB962C8B-B14F-4D97-AF65-F5344CB8AC3E}">
         <p14:creationId xmlns:p14="http://schemas.microsoft.com/office/powerpoint/2010/main" val="2735719579"/>
+      </p:ext>
+    </p:extLst>
+  </p:cSld>
+  <p:clrMapOvr>
+    <a:masterClrMapping/>
+  </p:clrMapOvr>
+</p:sld>
+</file>
+
+<file path=ppt/slides/slide16.xml><?xml version="1.0" encoding="utf-8"?>
+<p:sld xmlns:a="http://schemas.openxmlformats.org/drawingml/2006/main" xmlns:r="http://schemas.openxmlformats.org/officeDocument/2006/relationships" xmlns:p="http://schemas.openxmlformats.org/presentationml/2006/main">
+  <p:cSld>
+    <p:spTree>
+      <p:nvGrpSpPr>
+        <p:cNvPr id="1" name=""/>
+        <p:cNvGrpSpPr/>
+        <p:nvPr/>
+      </p:nvGrpSpPr>
+      <p:grpSpPr>
+        <a:xfrm>
+          <a:off x="0" y="0"/>
+          <a:ext cx="0" cy="0"/>
+          <a:chOff x="0" y="0"/>
+          <a:chExt cx="0" cy="0"/>
+        </a:xfrm>
+      </p:grpSpPr>
+      <p:sp>
+        <p:nvSpPr>
+          <p:cNvPr id="2" name="Title 1">
+            <a:extLst>
+              <a:ext uri="{FF2B5EF4-FFF2-40B4-BE49-F238E27FC236}">
+                <a16:creationId xmlns:a16="http://schemas.microsoft.com/office/drawing/2014/main" id="{796ACF0C-55FA-5B7A-0AAD-B999FAA6FDFB}"/>
+              </a:ext>
+            </a:extLst>
+          </p:cNvPr>
+          <p:cNvSpPr>
+            <a:spLocks noGrp="1"/>
+          </p:cNvSpPr>
+          <p:nvPr>
+            <p:ph type="title"/>
+          </p:nvPr>
+        </p:nvSpPr>
+        <p:spPr/>
+        <p:txBody>
+          <a:bodyPr/>
+          <a:lstStyle/>
+          <a:p>
+            <a:pPr algn="l"/>
+            <a:r>
+              <a:rPr lang="vi-VN" b="1">
+                <a:latin typeface="Open Sans" pitchFamily="2" charset="0"/>
+                <a:ea typeface="Open Sans" pitchFamily="2" charset="0"/>
+                <a:cs typeface="Open Sans" pitchFamily="2" charset="0"/>
+              </a:rPr>
+              <a:t>Bướ</a:t>
+            </a:r>
+            <a:r>
+              <a:rPr lang="en-US" b="1">
+                <a:latin typeface="Open Sans" pitchFamily="2" charset="0"/>
+                <a:ea typeface="Open Sans" pitchFamily="2" charset="0"/>
+                <a:cs typeface="Open Sans" pitchFamily="2" charset="0"/>
+              </a:rPr>
+              <a:t>c 12:</a:t>
+            </a:r>
+            <a:endParaRPr lang="vi-VN" b="1">
+              <a:latin typeface="Open Sans" pitchFamily="2" charset="0"/>
+              <a:ea typeface="Open Sans" pitchFamily="2" charset="0"/>
+              <a:cs typeface="Open Sans" pitchFamily="2" charset="0"/>
+            </a:endParaRPr>
+          </a:p>
+        </p:txBody>
+      </p:sp>
+      <p:sp>
+        <p:nvSpPr>
+          <p:cNvPr id="4" name="Content Placeholder 3">
+            <a:extLst>
+              <a:ext uri="{FF2B5EF4-FFF2-40B4-BE49-F238E27FC236}">
+                <a16:creationId xmlns:a16="http://schemas.microsoft.com/office/drawing/2014/main" id="{31A73BE9-170F-F106-7F2B-5A3F871D53E7}"/>
+              </a:ext>
+            </a:extLst>
+          </p:cNvPr>
+          <p:cNvSpPr>
+            <a:spLocks noGrp="1"/>
+          </p:cNvSpPr>
+          <p:nvPr>
+            <p:ph idx="1"/>
+          </p:nvPr>
+        </p:nvSpPr>
+        <p:spPr/>
+        <p:txBody>
+          <a:bodyPr/>
+          <a:lstStyle/>
+          <a:p>
+            <a:pPr marL="36900" indent="0">
+              <a:buNone/>
+            </a:pPr>
+            <a:r>
+              <a:rPr lang="en-US">
+                <a:latin typeface="Open Sans" pitchFamily="2" charset="0"/>
+                <a:ea typeface="Open Sans" pitchFamily="2" charset="0"/>
+                <a:cs typeface="Open Sans" pitchFamily="2" charset="0"/>
+              </a:rPr>
+              <a:t>Ngay tại bên trong cái thư mục trùng tên với repository</a:t>
+            </a:r>
+          </a:p>
+          <a:p>
+            <a:pPr>
+              <a:buFont typeface="Wingdings" panose="05000000000000000000" pitchFamily="2" charset="2"/>
+              <a:buChar char="à"/>
+            </a:pPr>
+            <a:r>
+              <a:rPr lang="en-US">
+                <a:latin typeface="Open Sans" pitchFamily="2" charset="0"/>
+                <a:ea typeface="Open Sans" pitchFamily="2" charset="0"/>
+                <a:cs typeface="Open Sans" pitchFamily="2" charset="0"/>
+                <a:sym typeface="Wingdings" panose="05000000000000000000" pitchFamily="2" charset="2"/>
+              </a:rPr>
+              <a:t>Bấm chuột phải.</a:t>
+            </a:r>
+          </a:p>
+          <a:p>
+            <a:pPr>
+              <a:buFont typeface="Wingdings" panose="05000000000000000000" pitchFamily="2" charset="2"/>
+              <a:buChar char="à"/>
+            </a:pPr>
+            <a:r>
+              <a:rPr lang="en-US">
+                <a:latin typeface="Open Sans" pitchFamily="2" charset="0"/>
+                <a:ea typeface="Open Sans" pitchFamily="2" charset="0"/>
+                <a:cs typeface="Open Sans" pitchFamily="2" charset="0"/>
+                <a:sym typeface="Wingdings" panose="05000000000000000000" pitchFamily="2" charset="2"/>
+              </a:rPr>
+              <a:t>Bấm Git Bash Here.</a:t>
+            </a:r>
+            <a:endParaRPr lang="vi-VN">
+              <a:latin typeface="Open Sans" pitchFamily="2" charset="0"/>
+              <a:ea typeface="Open Sans" pitchFamily="2" charset="0"/>
+              <a:cs typeface="Open Sans" pitchFamily="2" charset="0"/>
+            </a:endParaRPr>
+          </a:p>
+        </p:txBody>
+      </p:sp>
+      <p:pic>
+        <p:nvPicPr>
+          <p:cNvPr id="7" name="Picture 6">
+            <a:extLst>
+              <a:ext uri="{FF2B5EF4-FFF2-40B4-BE49-F238E27FC236}">
+                <a16:creationId xmlns:a16="http://schemas.microsoft.com/office/drawing/2014/main" id="{60705EC4-687C-C1BA-DFF8-EC729405B8C0}"/>
+              </a:ext>
+            </a:extLst>
+          </p:cNvPr>
+          <p:cNvPicPr>
+            <a:picLocks noChangeAspect="1"/>
+          </p:cNvPicPr>
+          <p:nvPr/>
+        </p:nvPicPr>
+        <p:blipFill>
+          <a:blip r:embed="rId2"/>
+          <a:stretch>
+            <a:fillRect/>
+          </a:stretch>
+        </p:blipFill>
+        <p:spPr>
+          <a:xfrm>
+            <a:off x="3549444" y="3429000"/>
+            <a:ext cx="5742039" cy="3229897"/>
+          </a:xfrm>
+          <a:prstGeom prst="rect">
+            <a:avLst/>
+          </a:prstGeom>
+          <a:ln w="28575" cap="sq">
+            <a:solidFill>
+              <a:srgbClr val="00B050"/>
+            </a:solidFill>
+            <a:miter lim="800000"/>
+          </a:ln>
+          <a:effectLst>
+            <a:outerShdw blurRad="57150" dist="50800" dir="2700000" algn="tl" rotWithShape="0">
+              <a:srgbClr val="000000">
+                <a:alpha val="40000"/>
+              </a:srgbClr>
+            </a:outerShdw>
+          </a:effectLst>
+        </p:spPr>
+      </p:pic>
+      <p:sp>
+        <p:nvSpPr>
+          <p:cNvPr id="8" name="Arrow: Right 7">
+            <a:extLst>
+              <a:ext uri="{FF2B5EF4-FFF2-40B4-BE49-F238E27FC236}">
+                <a16:creationId xmlns:a16="http://schemas.microsoft.com/office/drawing/2014/main" id="{4012BEBA-ECE0-FABA-362E-C0FB20E4AFE6}"/>
+              </a:ext>
+            </a:extLst>
+          </p:cNvPr>
+          <p:cNvSpPr/>
+          <p:nvPr/>
+        </p:nvSpPr>
+        <p:spPr>
+          <a:xfrm>
+            <a:off x="5458870" y="5289755"/>
+            <a:ext cx="1189703" cy="137652"/>
+          </a:xfrm>
+          <a:prstGeom prst="rightArrow">
+            <a:avLst/>
+          </a:prstGeom>
+          <a:solidFill>
+            <a:srgbClr val="FF0000"/>
+          </a:solidFill>
+          <a:ln>
+            <a:noFill/>
+          </a:ln>
+        </p:spPr>
+        <p:style>
+          <a:lnRef idx="2">
+            <a:schemeClr val="accent1">
+              <a:shade val="50000"/>
+            </a:schemeClr>
+          </a:lnRef>
+          <a:fillRef idx="1">
+            <a:schemeClr val="accent1"/>
+          </a:fillRef>
+          <a:effectRef idx="0">
+            <a:schemeClr val="accent1"/>
+          </a:effectRef>
+          <a:fontRef idx="minor">
+            <a:schemeClr val="lt1"/>
+          </a:fontRef>
+        </p:style>
+        <p:txBody>
+          <a:bodyPr rtlCol="0" anchor="ctr"/>
+          <a:lstStyle/>
+          <a:p>
+            <a:pPr algn="ctr"/>
+            <a:endParaRPr lang="vi-VN"/>
+          </a:p>
+        </p:txBody>
+      </p:sp>
+    </p:spTree>
+    <p:extLst>
+      <p:ext uri="{BB962C8B-B14F-4D97-AF65-F5344CB8AC3E}">
+        <p14:creationId xmlns:p14="http://schemas.microsoft.com/office/powerpoint/2010/main" val="3779618065"/>
+      </p:ext>
+    </p:extLst>
+  </p:cSld>
+  <p:clrMapOvr>
+    <a:masterClrMapping/>
+  </p:clrMapOvr>
+</p:sld>
+</file>
+
+<file path=ppt/slides/slide17.xml><?xml version="1.0" encoding="utf-8"?>
+<p:sld xmlns:a="http://schemas.openxmlformats.org/drawingml/2006/main" xmlns:r="http://schemas.openxmlformats.org/officeDocument/2006/relationships" xmlns:p="http://schemas.openxmlformats.org/presentationml/2006/main">
+  <p:cSld>
+    <p:spTree>
+      <p:nvGrpSpPr>
+        <p:cNvPr id="1" name=""/>
+        <p:cNvGrpSpPr/>
+        <p:nvPr/>
+      </p:nvGrpSpPr>
+      <p:grpSpPr>
+        <a:xfrm>
+          <a:off x="0" y="0"/>
+          <a:ext cx="0" cy="0"/>
+          <a:chOff x="0" y="0"/>
+          <a:chExt cx="0" cy="0"/>
+        </a:xfrm>
+      </p:grpSpPr>
+      <p:sp>
+        <p:nvSpPr>
+          <p:cNvPr id="2" name="Title 1">
+            <a:extLst>
+              <a:ext uri="{FF2B5EF4-FFF2-40B4-BE49-F238E27FC236}">
+                <a16:creationId xmlns:a16="http://schemas.microsoft.com/office/drawing/2014/main" id="{796ACF0C-55FA-5B7A-0AAD-B999FAA6FDFB}"/>
+              </a:ext>
+            </a:extLst>
+          </p:cNvPr>
+          <p:cNvSpPr>
+            <a:spLocks noGrp="1"/>
+          </p:cNvSpPr>
+          <p:nvPr>
+            <p:ph type="title"/>
+          </p:nvPr>
+        </p:nvSpPr>
+        <p:spPr/>
+        <p:txBody>
+          <a:bodyPr/>
+          <a:lstStyle/>
+          <a:p>
+            <a:pPr algn="l"/>
+            <a:r>
+              <a:rPr lang="vi-VN" b="1">
+                <a:latin typeface="Open Sans" pitchFamily="2" charset="0"/>
+                <a:ea typeface="Open Sans" pitchFamily="2" charset="0"/>
+                <a:cs typeface="Open Sans" pitchFamily="2" charset="0"/>
+              </a:rPr>
+              <a:t>Bướ</a:t>
+            </a:r>
+            <a:r>
+              <a:rPr lang="en-US" b="1">
+                <a:latin typeface="Open Sans" pitchFamily="2" charset="0"/>
+                <a:ea typeface="Open Sans" pitchFamily="2" charset="0"/>
+                <a:cs typeface="Open Sans" pitchFamily="2" charset="0"/>
+              </a:rPr>
+              <a:t>c 13:</a:t>
+            </a:r>
+            <a:endParaRPr lang="vi-VN" b="1">
+              <a:latin typeface="Open Sans" pitchFamily="2" charset="0"/>
+              <a:ea typeface="Open Sans" pitchFamily="2" charset="0"/>
+              <a:cs typeface="Open Sans" pitchFamily="2" charset="0"/>
+            </a:endParaRPr>
+          </a:p>
+        </p:txBody>
+      </p:sp>
+      <p:sp>
+        <p:nvSpPr>
+          <p:cNvPr id="4" name="Content Placeholder 3">
+            <a:extLst>
+              <a:ext uri="{FF2B5EF4-FFF2-40B4-BE49-F238E27FC236}">
+                <a16:creationId xmlns:a16="http://schemas.microsoft.com/office/drawing/2014/main" id="{31A73BE9-170F-F106-7F2B-5A3F871D53E7}"/>
+              </a:ext>
+            </a:extLst>
+          </p:cNvPr>
+          <p:cNvSpPr>
+            <a:spLocks noGrp="1"/>
+          </p:cNvSpPr>
+          <p:nvPr>
+            <p:ph idx="1"/>
+          </p:nvPr>
+        </p:nvSpPr>
+        <p:spPr/>
+        <p:txBody>
+          <a:bodyPr/>
+          <a:lstStyle/>
+          <a:p>
+            <a:pPr marL="36900" indent="0">
+              <a:buNone/>
+            </a:pPr>
+            <a:r>
+              <a:rPr lang="en-US">
+                <a:latin typeface="Open Sans" pitchFamily="2" charset="0"/>
+                <a:ea typeface="Open Sans" pitchFamily="2" charset="0"/>
+                <a:cs typeface="Open Sans" pitchFamily="2" charset="0"/>
+              </a:rPr>
+              <a:t>Nhập git add .</a:t>
+            </a:r>
+          </a:p>
+          <a:p>
+            <a:pPr marL="36900" indent="0">
+              <a:buNone/>
+            </a:pPr>
+            <a:r>
+              <a:rPr lang="en-US">
+                <a:latin typeface="Open Sans" pitchFamily="2" charset="0"/>
+                <a:ea typeface="Open Sans" pitchFamily="2" charset="0"/>
+                <a:cs typeface="Open Sans" pitchFamily="2" charset="0"/>
+                <a:sym typeface="Wingdings" panose="05000000000000000000" pitchFamily="2" charset="2"/>
+              </a:rPr>
+              <a:t> Bấm Enter.</a:t>
+            </a:r>
+            <a:endParaRPr lang="vi-VN">
+              <a:latin typeface="Open Sans" pitchFamily="2" charset="0"/>
+              <a:ea typeface="Open Sans" pitchFamily="2" charset="0"/>
+              <a:cs typeface="Open Sans" pitchFamily="2" charset="0"/>
+            </a:endParaRPr>
+          </a:p>
+        </p:txBody>
+      </p:sp>
+      <p:pic>
+        <p:nvPicPr>
+          <p:cNvPr id="5" name="Picture 4">
+            <a:extLst>
+              <a:ext uri="{FF2B5EF4-FFF2-40B4-BE49-F238E27FC236}">
+                <a16:creationId xmlns:a16="http://schemas.microsoft.com/office/drawing/2014/main" id="{282423E6-7F21-926A-FD77-55BE4133843A}"/>
+              </a:ext>
+            </a:extLst>
+          </p:cNvPr>
+          <p:cNvPicPr>
+            <a:picLocks noChangeAspect="1"/>
+          </p:cNvPicPr>
+          <p:nvPr/>
+        </p:nvPicPr>
+        <p:blipFill>
+          <a:blip r:embed="rId2"/>
+          <a:stretch>
+            <a:fillRect/>
+          </a:stretch>
+        </p:blipFill>
+        <p:spPr>
+          <a:xfrm>
+            <a:off x="1819381" y="3206752"/>
+            <a:ext cx="8553239" cy="3274428"/>
+          </a:xfrm>
+          <a:prstGeom prst="rect">
+            <a:avLst/>
+          </a:prstGeom>
+        </p:spPr>
+      </p:pic>
+    </p:spTree>
+    <p:extLst>
+      <p:ext uri="{BB962C8B-B14F-4D97-AF65-F5344CB8AC3E}">
+        <p14:creationId xmlns:p14="http://schemas.microsoft.com/office/powerpoint/2010/main" val="3019429062"/>
+      </p:ext>
+    </p:extLst>
+  </p:cSld>
+  <p:clrMapOvr>
+    <a:masterClrMapping/>
+  </p:clrMapOvr>
+</p:sld>
+</file>
+
+<file path=ppt/slides/slide18.xml><?xml version="1.0" encoding="utf-8"?>
+<p:sld xmlns:a="http://schemas.openxmlformats.org/drawingml/2006/main" xmlns:r="http://schemas.openxmlformats.org/officeDocument/2006/relationships" xmlns:p="http://schemas.openxmlformats.org/presentationml/2006/main">
+  <p:cSld>
+    <p:spTree>
+      <p:nvGrpSpPr>
+        <p:cNvPr id="1" name=""/>
+        <p:cNvGrpSpPr/>
+        <p:nvPr/>
+      </p:nvGrpSpPr>
+      <p:grpSpPr>
+        <a:xfrm>
+          <a:off x="0" y="0"/>
+          <a:ext cx="0" cy="0"/>
+          <a:chOff x="0" y="0"/>
+          <a:chExt cx="0" cy="0"/>
+        </a:xfrm>
+      </p:grpSpPr>
+      <p:sp>
+        <p:nvSpPr>
+          <p:cNvPr id="2" name="Title 1">
+            <a:extLst>
+              <a:ext uri="{FF2B5EF4-FFF2-40B4-BE49-F238E27FC236}">
+                <a16:creationId xmlns:a16="http://schemas.microsoft.com/office/drawing/2014/main" id="{796ACF0C-55FA-5B7A-0AAD-B999FAA6FDFB}"/>
+              </a:ext>
+            </a:extLst>
+          </p:cNvPr>
+          <p:cNvSpPr>
+            <a:spLocks noGrp="1"/>
+          </p:cNvSpPr>
+          <p:nvPr>
+            <p:ph type="title"/>
+          </p:nvPr>
+        </p:nvSpPr>
+        <p:spPr/>
+        <p:txBody>
+          <a:bodyPr/>
+          <a:lstStyle/>
+          <a:p>
+            <a:pPr algn="l"/>
+            <a:r>
+              <a:rPr lang="vi-VN" b="1">
+                <a:latin typeface="Open Sans" pitchFamily="2" charset="0"/>
+                <a:ea typeface="Open Sans" pitchFamily="2" charset="0"/>
+                <a:cs typeface="Open Sans" pitchFamily="2" charset="0"/>
+              </a:rPr>
+              <a:t>Bướ</a:t>
+            </a:r>
+            <a:r>
+              <a:rPr lang="en-US" b="1">
+                <a:latin typeface="Open Sans" pitchFamily="2" charset="0"/>
+                <a:ea typeface="Open Sans" pitchFamily="2" charset="0"/>
+                <a:cs typeface="Open Sans" pitchFamily="2" charset="0"/>
+              </a:rPr>
+              <a:t>c 14:</a:t>
+            </a:r>
+            <a:endParaRPr lang="vi-VN" b="1">
+              <a:latin typeface="Open Sans" pitchFamily="2" charset="0"/>
+              <a:ea typeface="Open Sans" pitchFamily="2" charset="0"/>
+              <a:cs typeface="Open Sans" pitchFamily="2" charset="0"/>
+            </a:endParaRPr>
+          </a:p>
+        </p:txBody>
+      </p:sp>
+      <p:sp>
+        <p:nvSpPr>
+          <p:cNvPr id="4" name="Content Placeholder 3">
+            <a:extLst>
+              <a:ext uri="{FF2B5EF4-FFF2-40B4-BE49-F238E27FC236}">
+                <a16:creationId xmlns:a16="http://schemas.microsoft.com/office/drawing/2014/main" id="{31A73BE9-170F-F106-7F2B-5A3F871D53E7}"/>
+              </a:ext>
+            </a:extLst>
+          </p:cNvPr>
+          <p:cNvSpPr>
+            <a:spLocks noGrp="1"/>
+          </p:cNvSpPr>
+          <p:nvPr>
+            <p:ph idx="1"/>
+          </p:nvPr>
+        </p:nvSpPr>
+        <p:spPr/>
+        <p:txBody>
+          <a:bodyPr/>
+          <a:lstStyle/>
+          <a:p>
+            <a:pPr marL="36900" indent="0">
+              <a:buNone/>
+            </a:pPr>
+            <a:r>
+              <a:rPr lang="en-US">
+                <a:latin typeface="Open Sans" pitchFamily="2" charset="0"/>
+                <a:ea typeface="Open Sans" pitchFamily="2" charset="0"/>
+                <a:cs typeface="Open Sans" pitchFamily="2" charset="0"/>
+              </a:rPr>
+              <a:t>Bước này gọi là bước   commit   .</a:t>
+            </a:r>
+          </a:p>
+          <a:p>
+            <a:pPr marL="36900" indent="0">
+              <a:buNone/>
+            </a:pPr>
+            <a:endParaRPr lang="en-US">
+              <a:latin typeface="Open Sans" pitchFamily="2" charset="0"/>
+              <a:ea typeface="Open Sans" pitchFamily="2" charset="0"/>
+              <a:cs typeface="Open Sans" pitchFamily="2" charset="0"/>
+            </a:endParaRPr>
+          </a:p>
+          <a:p>
+            <a:pPr marL="36900" indent="0">
+              <a:buNone/>
+            </a:pPr>
+            <a:endParaRPr lang="en-US">
+              <a:latin typeface="Open Sans" pitchFamily="2" charset="0"/>
+              <a:ea typeface="Open Sans" pitchFamily="2" charset="0"/>
+              <a:cs typeface="Open Sans" pitchFamily="2" charset="0"/>
+            </a:endParaRPr>
+          </a:p>
+          <a:p>
+            <a:pPr marL="36900" indent="0">
+              <a:buNone/>
+            </a:pPr>
+            <a:endParaRPr lang="en-US">
+              <a:latin typeface="Open Sans" pitchFamily="2" charset="0"/>
+              <a:ea typeface="Open Sans" pitchFamily="2" charset="0"/>
+              <a:cs typeface="Open Sans" pitchFamily="2" charset="0"/>
+            </a:endParaRPr>
+          </a:p>
+          <a:p>
+            <a:pPr marL="36900" indent="0">
+              <a:buNone/>
+            </a:pPr>
+            <a:endParaRPr lang="en-US">
+              <a:latin typeface="Open Sans" pitchFamily="2" charset="0"/>
+              <a:ea typeface="Open Sans" pitchFamily="2" charset="0"/>
+              <a:cs typeface="Open Sans" pitchFamily="2" charset="0"/>
+            </a:endParaRPr>
+          </a:p>
+          <a:p>
+            <a:pPr marL="36900" indent="0">
+              <a:buNone/>
+            </a:pPr>
+            <a:r>
+              <a:rPr lang="en-US">
+                <a:latin typeface="Open Sans" pitchFamily="2" charset="0"/>
+                <a:ea typeface="Open Sans" pitchFamily="2" charset="0"/>
+                <a:cs typeface="Open Sans" pitchFamily="2" charset="0"/>
+              </a:rPr>
+              <a:t>Nhập git commit –m “   gui file len GitHub   ”</a:t>
+            </a:r>
+          </a:p>
+          <a:p>
+            <a:pPr marL="36900" indent="0">
+              <a:buNone/>
+            </a:pPr>
+            <a:endParaRPr lang="en-US">
+              <a:latin typeface="Open Sans" pitchFamily="2" charset="0"/>
+              <a:ea typeface="Open Sans" pitchFamily="2" charset="0"/>
+              <a:cs typeface="Open Sans" pitchFamily="2" charset="0"/>
+            </a:endParaRPr>
+          </a:p>
+          <a:p>
+            <a:pPr marL="36900" indent="0">
+              <a:buNone/>
+            </a:pPr>
+            <a:r>
+              <a:rPr lang="en-US">
+                <a:latin typeface="Open Sans" pitchFamily="2" charset="0"/>
+                <a:ea typeface="Open Sans" pitchFamily="2" charset="0"/>
+                <a:cs typeface="Open Sans" pitchFamily="2" charset="0"/>
+                <a:sym typeface="Wingdings" panose="05000000000000000000" pitchFamily="2" charset="2"/>
+              </a:rPr>
+              <a:t> Bấm Enter</a:t>
+            </a:r>
+            <a:endParaRPr lang="en-US">
+              <a:latin typeface="Open Sans" pitchFamily="2" charset="0"/>
+              <a:ea typeface="Open Sans" pitchFamily="2" charset="0"/>
+              <a:cs typeface="Open Sans" pitchFamily="2" charset="0"/>
+            </a:endParaRPr>
+          </a:p>
+        </p:txBody>
+      </p:sp>
+      <p:sp>
+        <p:nvSpPr>
+          <p:cNvPr id="3" name="Rectangle 2">
+            <a:extLst>
+              <a:ext uri="{FF2B5EF4-FFF2-40B4-BE49-F238E27FC236}">
+                <a16:creationId xmlns:a16="http://schemas.microsoft.com/office/drawing/2014/main" id="{7E6C1E2F-E987-4A8F-7429-D974CF1D51A8}"/>
+              </a:ext>
+            </a:extLst>
+          </p:cNvPr>
+          <p:cNvSpPr/>
+          <p:nvPr/>
+        </p:nvSpPr>
+        <p:spPr>
+          <a:xfrm>
+            <a:off x="3592286" y="2002971"/>
+            <a:ext cx="1121228" cy="566058"/>
+          </a:xfrm>
+          <a:prstGeom prst="rect">
+            <a:avLst/>
+          </a:prstGeom>
+          <a:noFill/>
+          <a:ln w="28575">
+            <a:solidFill>
+              <a:srgbClr val="FFFF00"/>
+            </a:solidFill>
+          </a:ln>
+        </p:spPr>
+        <p:style>
+          <a:lnRef idx="0">
+            <a:scrgbClr r="0" g="0" b="0"/>
+          </a:lnRef>
+          <a:fillRef idx="0">
+            <a:scrgbClr r="0" g="0" b="0"/>
+          </a:fillRef>
+          <a:effectRef idx="0">
+            <a:scrgbClr r="0" g="0" b="0"/>
+          </a:effectRef>
+          <a:fontRef idx="minor">
+            <a:schemeClr val="accent6"/>
+          </a:fontRef>
+        </p:style>
+        <p:txBody>
+          <a:bodyPr rtlCol="0" anchor="ctr"/>
+          <a:lstStyle/>
+          <a:p>
+            <a:pPr algn="ctr"/>
+            <a:endParaRPr lang="vi-VN"/>
+          </a:p>
+        </p:txBody>
+      </p:sp>
+      <p:sp>
+        <p:nvSpPr>
+          <p:cNvPr id="6" name="TextBox 5">
+            <a:extLst>
+              <a:ext uri="{FF2B5EF4-FFF2-40B4-BE49-F238E27FC236}">
+                <a16:creationId xmlns:a16="http://schemas.microsoft.com/office/drawing/2014/main" id="{8EC54C98-BB1E-F24A-8F9E-C9A3C0229B0F}"/>
+              </a:ext>
+            </a:extLst>
+          </p:cNvPr>
+          <p:cNvSpPr txBox="1"/>
+          <p:nvPr/>
+        </p:nvSpPr>
+        <p:spPr>
+          <a:xfrm>
+            <a:off x="5921828" y="2917371"/>
+            <a:ext cx="5606985" cy="369332"/>
+          </a:xfrm>
+          <a:prstGeom prst="rect">
+            <a:avLst/>
+          </a:prstGeom>
+          <a:noFill/>
+        </p:spPr>
+        <p:txBody>
+          <a:bodyPr wrap="square" rtlCol="0">
+            <a:spAutoFit/>
+          </a:bodyPr>
+          <a:lstStyle/>
+          <a:p>
+            <a:r>
+              <a:rPr lang="en-US">
+                <a:latin typeface="Open Sans" pitchFamily="2" charset="0"/>
+                <a:ea typeface="Open Sans" pitchFamily="2" charset="0"/>
+                <a:cs typeface="Open Sans" pitchFamily="2" charset="0"/>
+              </a:rPr>
+              <a:t>Dịch ra </a:t>
+            </a:r>
+            <a:r>
+              <a:rPr lang="en-US" b="1">
+                <a:solidFill>
+                  <a:srgbClr val="FFFF00"/>
+                </a:solidFill>
+                <a:latin typeface="Open Sans" pitchFamily="2" charset="0"/>
+                <a:ea typeface="Open Sans" pitchFamily="2" charset="0"/>
+                <a:cs typeface="Open Sans" pitchFamily="2" charset="0"/>
+              </a:rPr>
+              <a:t>tiếng Việt </a:t>
+            </a:r>
+            <a:r>
+              <a:rPr lang="en-US">
+                <a:latin typeface="Open Sans" pitchFamily="2" charset="0"/>
+                <a:ea typeface="Open Sans" pitchFamily="2" charset="0"/>
+                <a:cs typeface="Open Sans" pitchFamily="2" charset="0"/>
+              </a:rPr>
+              <a:t>là làm, cam kết, thực hiện.</a:t>
+            </a:r>
+            <a:endParaRPr lang="vi-VN">
+              <a:latin typeface="Open Sans" pitchFamily="2" charset="0"/>
+              <a:ea typeface="Open Sans" pitchFamily="2" charset="0"/>
+              <a:cs typeface="Open Sans" pitchFamily="2" charset="0"/>
+            </a:endParaRPr>
+          </a:p>
+        </p:txBody>
+      </p:sp>
+      <p:cxnSp>
+        <p:nvCxnSpPr>
+          <p:cNvPr id="8" name="Straight Arrow Connector 7">
+            <a:extLst>
+              <a:ext uri="{FF2B5EF4-FFF2-40B4-BE49-F238E27FC236}">
+                <a16:creationId xmlns:a16="http://schemas.microsoft.com/office/drawing/2014/main" id="{7178281C-5CC8-D83D-F1D4-B526A91FD9E8}"/>
+              </a:ext>
+            </a:extLst>
+          </p:cNvPr>
+          <p:cNvCxnSpPr>
+            <a:cxnSpLocks/>
+          </p:cNvCxnSpPr>
+          <p:nvPr/>
+        </p:nvCxnSpPr>
+        <p:spPr>
+          <a:xfrm>
+            <a:off x="4974771" y="2569029"/>
+            <a:ext cx="947058" cy="435428"/>
+          </a:xfrm>
+          <a:prstGeom prst="straightConnector1">
+            <a:avLst/>
+          </a:prstGeom>
+          <a:ln w="28575">
+            <a:solidFill>
+              <a:srgbClr val="FFFF00"/>
+            </a:solidFill>
+            <a:tailEnd type="triangle"/>
+          </a:ln>
+        </p:spPr>
+        <p:style>
+          <a:lnRef idx="1">
+            <a:schemeClr val="accent1"/>
+          </a:lnRef>
+          <a:fillRef idx="0">
+            <a:schemeClr val="accent1"/>
+          </a:fillRef>
+          <a:effectRef idx="0">
+            <a:schemeClr val="accent1"/>
+          </a:effectRef>
+          <a:fontRef idx="minor">
+            <a:schemeClr val="tx1"/>
+          </a:fontRef>
+        </p:style>
+      </p:cxnSp>
+      <p:sp>
+        <p:nvSpPr>
+          <p:cNvPr id="12" name="Rectangle 11">
+            <a:extLst>
+              <a:ext uri="{FF2B5EF4-FFF2-40B4-BE49-F238E27FC236}">
+                <a16:creationId xmlns:a16="http://schemas.microsoft.com/office/drawing/2014/main" id="{A9BD961A-F551-84D7-E196-AAF46D86BB44}"/>
+              </a:ext>
+            </a:extLst>
+          </p:cNvPr>
+          <p:cNvSpPr/>
+          <p:nvPr/>
+        </p:nvSpPr>
+        <p:spPr>
+          <a:xfrm>
+            <a:off x="3701144" y="4288972"/>
+            <a:ext cx="2296886" cy="435428"/>
+          </a:xfrm>
+          <a:prstGeom prst="rect">
+            <a:avLst/>
+          </a:prstGeom>
+          <a:noFill/>
+          <a:ln w="28575">
+            <a:solidFill>
+              <a:srgbClr val="FFFF00"/>
+            </a:solidFill>
+          </a:ln>
+        </p:spPr>
+        <p:style>
+          <a:lnRef idx="0">
+            <a:scrgbClr r="0" g="0" b="0"/>
+          </a:lnRef>
+          <a:fillRef idx="0">
+            <a:scrgbClr r="0" g="0" b="0"/>
+          </a:fillRef>
+          <a:effectRef idx="0">
+            <a:scrgbClr r="0" g="0" b="0"/>
+          </a:effectRef>
+          <a:fontRef idx="minor">
+            <a:schemeClr val="accent6"/>
+          </a:fontRef>
+        </p:style>
+        <p:txBody>
+          <a:bodyPr rtlCol="0" anchor="ctr"/>
+          <a:lstStyle/>
+          <a:p>
+            <a:pPr algn="ctr"/>
+            <a:endParaRPr lang="vi-VN"/>
+          </a:p>
+        </p:txBody>
+      </p:sp>
+      <p:sp>
+        <p:nvSpPr>
+          <p:cNvPr id="13" name="TextBox 12">
+            <a:extLst>
+              <a:ext uri="{FF2B5EF4-FFF2-40B4-BE49-F238E27FC236}">
+                <a16:creationId xmlns:a16="http://schemas.microsoft.com/office/drawing/2014/main" id="{468E811C-2B52-F968-BC77-6D2814A6463C}"/>
+              </a:ext>
+            </a:extLst>
+          </p:cNvPr>
+          <p:cNvSpPr txBox="1"/>
+          <p:nvPr/>
+        </p:nvSpPr>
+        <p:spPr>
+          <a:xfrm>
+            <a:off x="5921828" y="5203371"/>
+            <a:ext cx="5218115" cy="646331"/>
+          </a:xfrm>
+          <a:prstGeom prst="rect">
+            <a:avLst/>
+          </a:prstGeom>
+          <a:noFill/>
+        </p:spPr>
+        <p:txBody>
+          <a:bodyPr wrap="square" rtlCol="0">
+            <a:spAutoFit/>
+          </a:bodyPr>
+          <a:lstStyle/>
+          <a:p>
+            <a:r>
+              <a:rPr lang="en-US">
+                <a:latin typeface="Open Sans" pitchFamily="2" charset="0"/>
+                <a:ea typeface="Open Sans" pitchFamily="2" charset="0"/>
+                <a:cs typeface="Open Sans" pitchFamily="2" charset="0"/>
+              </a:rPr>
+              <a:t>Bên trong dấu ngoặc kép thì dùng để viết tin nhắn (message).</a:t>
+            </a:r>
+            <a:endParaRPr lang="vi-VN">
+              <a:latin typeface="Open Sans" pitchFamily="2" charset="0"/>
+              <a:ea typeface="Open Sans" pitchFamily="2" charset="0"/>
+              <a:cs typeface="Open Sans" pitchFamily="2" charset="0"/>
+            </a:endParaRPr>
+          </a:p>
+        </p:txBody>
+      </p:sp>
+      <p:cxnSp>
+        <p:nvCxnSpPr>
+          <p:cNvPr id="18" name="Connector: Elbow 17">
+            <a:extLst>
+              <a:ext uri="{FF2B5EF4-FFF2-40B4-BE49-F238E27FC236}">
+                <a16:creationId xmlns:a16="http://schemas.microsoft.com/office/drawing/2014/main" id="{DD3397D4-4C77-DBEA-F3B4-30F0E3851DAB}"/>
+              </a:ext>
+            </a:extLst>
+          </p:cNvPr>
+          <p:cNvCxnSpPr>
+            <a:cxnSpLocks/>
+            <a:stCxn id="12" idx="2"/>
+            <a:endCxn id="13" idx="1"/>
+          </p:cNvCxnSpPr>
+          <p:nvPr/>
+        </p:nvCxnSpPr>
+        <p:spPr>
+          <a:xfrm rot="16200000" flipH="1">
+            <a:off x="4984639" y="4589347"/>
+            <a:ext cx="802137" cy="1072241"/>
+          </a:xfrm>
+          <a:prstGeom prst="bentConnector2">
+            <a:avLst/>
+          </a:prstGeom>
+          <a:ln w="28575">
+            <a:solidFill>
+              <a:srgbClr val="FFFF00"/>
+            </a:solidFill>
+            <a:tailEnd type="triangle"/>
+          </a:ln>
+        </p:spPr>
+        <p:style>
+          <a:lnRef idx="1">
+            <a:schemeClr val="accent1"/>
+          </a:lnRef>
+          <a:fillRef idx="0">
+            <a:schemeClr val="accent1"/>
+          </a:fillRef>
+          <a:effectRef idx="0">
+            <a:schemeClr val="accent1"/>
+          </a:effectRef>
+          <a:fontRef idx="minor">
+            <a:schemeClr val="tx1"/>
+          </a:fontRef>
+        </p:style>
+      </p:cxnSp>
+    </p:spTree>
+    <p:extLst>
+      <p:ext uri="{BB962C8B-B14F-4D97-AF65-F5344CB8AC3E}">
+        <p14:creationId xmlns:p14="http://schemas.microsoft.com/office/powerpoint/2010/main" val="3955449955"/>
+      </p:ext>
+    </p:extLst>
+  </p:cSld>
+  <p:clrMapOvr>
+    <a:masterClrMapping/>
+  </p:clrMapOvr>
+</p:sld>
+</file>
+
+<file path=ppt/slides/slide19.xml><?xml version="1.0" encoding="utf-8"?>
+<p:sld xmlns:a="http://schemas.openxmlformats.org/drawingml/2006/main" xmlns:r="http://schemas.openxmlformats.org/officeDocument/2006/relationships" xmlns:p="http://schemas.openxmlformats.org/presentationml/2006/main">
+  <p:cSld>
+    <p:spTree>
+      <p:nvGrpSpPr>
+        <p:cNvPr id="1" name=""/>
+        <p:cNvGrpSpPr/>
+        <p:nvPr/>
+      </p:nvGrpSpPr>
+      <p:grpSpPr>
+        <a:xfrm>
+          <a:off x="0" y="0"/>
+          <a:ext cx="0" cy="0"/>
+          <a:chOff x="0" y="0"/>
+          <a:chExt cx="0" cy="0"/>
+        </a:xfrm>
+      </p:grpSpPr>
+      <p:sp>
+        <p:nvSpPr>
+          <p:cNvPr id="2" name="Title 1">
+            <a:extLst>
+              <a:ext uri="{FF2B5EF4-FFF2-40B4-BE49-F238E27FC236}">
+                <a16:creationId xmlns:a16="http://schemas.microsoft.com/office/drawing/2014/main" id="{796ACF0C-55FA-5B7A-0AAD-B999FAA6FDFB}"/>
+              </a:ext>
+            </a:extLst>
+          </p:cNvPr>
+          <p:cNvSpPr>
+            <a:spLocks noGrp="1"/>
+          </p:cNvSpPr>
+          <p:nvPr>
+            <p:ph type="title"/>
+          </p:nvPr>
+        </p:nvSpPr>
+        <p:spPr/>
+        <p:txBody>
+          <a:bodyPr/>
+          <a:lstStyle/>
+          <a:p>
+            <a:pPr algn="l"/>
+            <a:r>
+              <a:rPr lang="vi-VN" b="1">
+                <a:latin typeface="Open Sans" pitchFamily="2" charset="0"/>
+                <a:ea typeface="Open Sans" pitchFamily="2" charset="0"/>
+                <a:cs typeface="Open Sans" pitchFamily="2" charset="0"/>
+              </a:rPr>
+              <a:t>Bướ</a:t>
+            </a:r>
+            <a:r>
+              <a:rPr lang="en-US" b="1">
+                <a:latin typeface="Open Sans" pitchFamily="2" charset="0"/>
+                <a:ea typeface="Open Sans" pitchFamily="2" charset="0"/>
+                <a:cs typeface="Open Sans" pitchFamily="2" charset="0"/>
+              </a:rPr>
+              <a:t>c 14:</a:t>
+            </a:r>
+            <a:endParaRPr lang="vi-VN" b="1">
+              <a:latin typeface="Open Sans" pitchFamily="2" charset="0"/>
+              <a:ea typeface="Open Sans" pitchFamily="2" charset="0"/>
+              <a:cs typeface="Open Sans" pitchFamily="2" charset="0"/>
+            </a:endParaRPr>
+          </a:p>
+        </p:txBody>
+      </p:sp>
+      <p:pic>
+        <p:nvPicPr>
+          <p:cNvPr id="7" name="Content Placeholder 6">
+            <a:extLst>
+              <a:ext uri="{FF2B5EF4-FFF2-40B4-BE49-F238E27FC236}">
+                <a16:creationId xmlns:a16="http://schemas.microsoft.com/office/drawing/2014/main" id="{7F510936-65CD-3DFC-654B-9FE86969145C}"/>
+              </a:ext>
+            </a:extLst>
+          </p:cNvPr>
+          <p:cNvPicPr>
+            <a:picLocks noGrp="1" noChangeAspect="1"/>
+          </p:cNvPicPr>
+          <p:nvPr>
+            <p:ph idx="1"/>
+          </p:nvPr>
+        </p:nvPicPr>
+        <p:blipFill>
+          <a:blip r:embed="rId2"/>
+          <a:stretch>
+            <a:fillRect/>
+          </a:stretch>
+        </p:blipFill>
+        <p:spPr>
+          <a:xfrm>
+            <a:off x="1131157" y="2076450"/>
+            <a:ext cx="9929687" cy="3714750"/>
+          </a:xfrm>
+        </p:spPr>
+      </p:pic>
+      <p:sp>
+        <p:nvSpPr>
+          <p:cNvPr id="9" name="TextBox 8">
+            <a:extLst>
+              <a:ext uri="{FF2B5EF4-FFF2-40B4-BE49-F238E27FC236}">
+                <a16:creationId xmlns:a16="http://schemas.microsoft.com/office/drawing/2014/main" id="{708C0A72-18B1-406F-1996-99C5A1411101}"/>
+              </a:ext>
+            </a:extLst>
+          </p:cNvPr>
+          <p:cNvSpPr txBox="1"/>
+          <p:nvPr/>
+        </p:nvSpPr>
+        <p:spPr>
+          <a:xfrm>
+            <a:off x="3815443" y="5943600"/>
+            <a:ext cx="4561114" cy="369332"/>
+          </a:xfrm>
+          <a:prstGeom prst="rect">
+            <a:avLst/>
+          </a:prstGeom>
+          <a:noFill/>
+        </p:spPr>
+        <p:txBody>
+          <a:bodyPr wrap="square" rtlCol="0">
+            <a:spAutoFit/>
+          </a:bodyPr>
+          <a:lstStyle/>
+          <a:p>
+            <a:pPr algn="ctr"/>
+            <a:r>
+              <a:rPr lang="en-US">
+                <a:latin typeface="Open Sans" pitchFamily="2" charset="0"/>
+                <a:ea typeface="Open Sans" pitchFamily="2" charset="0"/>
+                <a:cs typeface="Open Sans" pitchFamily="2" charset="0"/>
+              </a:rPr>
+              <a:t>Đây là khi bấm Enter thành công</a:t>
+            </a:r>
+            <a:endParaRPr lang="vi-VN">
+              <a:latin typeface="Open Sans" pitchFamily="2" charset="0"/>
+              <a:ea typeface="Open Sans" pitchFamily="2" charset="0"/>
+              <a:cs typeface="Open Sans" pitchFamily="2" charset="0"/>
+            </a:endParaRPr>
+          </a:p>
+        </p:txBody>
+      </p:sp>
+    </p:spTree>
+    <p:extLst>
+      <p:ext uri="{BB962C8B-B14F-4D97-AF65-F5344CB8AC3E}">
+        <p14:creationId xmlns:p14="http://schemas.microsoft.com/office/powerpoint/2010/main" val="3703750637"/>
       </p:ext>
     </p:extLst>
   </p:cSld>
@@ -8776,6 +10405,1131 @@
     <p:extLst>
       <p:ext uri="{BB962C8B-B14F-4D97-AF65-F5344CB8AC3E}">
         <p14:creationId xmlns:p14="http://schemas.microsoft.com/office/powerpoint/2010/main" val="4246495249"/>
+      </p:ext>
+    </p:extLst>
+  </p:cSld>
+  <p:clrMapOvr>
+    <a:masterClrMapping/>
+  </p:clrMapOvr>
+</p:sld>
+</file>
+
+<file path=ppt/slides/slide20.xml><?xml version="1.0" encoding="utf-8"?>
+<p:sld xmlns:a="http://schemas.openxmlformats.org/drawingml/2006/main" xmlns:r="http://schemas.openxmlformats.org/officeDocument/2006/relationships" xmlns:p="http://schemas.openxmlformats.org/presentationml/2006/main">
+  <p:cSld>
+    <p:spTree>
+      <p:nvGrpSpPr>
+        <p:cNvPr id="1" name=""/>
+        <p:cNvGrpSpPr/>
+        <p:nvPr/>
+      </p:nvGrpSpPr>
+      <p:grpSpPr>
+        <a:xfrm>
+          <a:off x="0" y="0"/>
+          <a:ext cx="0" cy="0"/>
+          <a:chOff x="0" y="0"/>
+          <a:chExt cx="0" cy="0"/>
+        </a:xfrm>
+      </p:grpSpPr>
+      <p:sp>
+        <p:nvSpPr>
+          <p:cNvPr id="2" name="Title 1">
+            <a:extLst>
+              <a:ext uri="{FF2B5EF4-FFF2-40B4-BE49-F238E27FC236}">
+                <a16:creationId xmlns:a16="http://schemas.microsoft.com/office/drawing/2014/main" id="{796ACF0C-55FA-5B7A-0AAD-B999FAA6FDFB}"/>
+              </a:ext>
+            </a:extLst>
+          </p:cNvPr>
+          <p:cNvSpPr>
+            <a:spLocks noGrp="1"/>
+          </p:cNvSpPr>
+          <p:nvPr>
+            <p:ph type="title"/>
+          </p:nvPr>
+        </p:nvSpPr>
+        <p:spPr/>
+        <p:txBody>
+          <a:bodyPr/>
+          <a:lstStyle/>
+          <a:p>
+            <a:pPr algn="l"/>
+            <a:r>
+              <a:rPr lang="vi-VN" b="1">
+                <a:latin typeface="Open Sans" pitchFamily="2" charset="0"/>
+                <a:ea typeface="Open Sans" pitchFamily="2" charset="0"/>
+                <a:cs typeface="Open Sans" pitchFamily="2" charset="0"/>
+              </a:rPr>
+              <a:t>Bướ</a:t>
+            </a:r>
+            <a:r>
+              <a:rPr lang="en-US" b="1">
+                <a:latin typeface="Open Sans" pitchFamily="2" charset="0"/>
+                <a:ea typeface="Open Sans" pitchFamily="2" charset="0"/>
+                <a:cs typeface="Open Sans" pitchFamily="2" charset="0"/>
+              </a:rPr>
+              <a:t>c 14.5:</a:t>
+            </a:r>
+            <a:endParaRPr lang="vi-VN" b="1">
+              <a:latin typeface="Open Sans" pitchFamily="2" charset="0"/>
+              <a:ea typeface="Open Sans" pitchFamily="2" charset="0"/>
+              <a:cs typeface="Open Sans" pitchFamily="2" charset="0"/>
+            </a:endParaRPr>
+          </a:p>
+        </p:txBody>
+      </p:sp>
+      <p:sp>
+        <p:nvSpPr>
+          <p:cNvPr id="4" name="Content Placeholder 3">
+            <a:extLst>
+              <a:ext uri="{FF2B5EF4-FFF2-40B4-BE49-F238E27FC236}">
+                <a16:creationId xmlns:a16="http://schemas.microsoft.com/office/drawing/2014/main" id="{6BF57A7B-6BFA-2083-96CA-1020B8B5A568}"/>
+              </a:ext>
+            </a:extLst>
+          </p:cNvPr>
+          <p:cNvSpPr>
+            <a:spLocks noGrp="1"/>
+          </p:cNvSpPr>
+          <p:nvPr>
+            <p:ph idx="1"/>
+          </p:nvPr>
+        </p:nvSpPr>
+        <p:spPr/>
+        <p:txBody>
+          <a:bodyPr>
+            <a:normAutofit/>
+          </a:bodyPr>
+          <a:lstStyle/>
+          <a:p>
+            <a:pPr marL="36900" indent="0">
+              <a:buNone/>
+            </a:pPr>
+            <a:r>
+              <a:rPr lang="en-US" sz="2800">
+                <a:latin typeface="Open Sans" pitchFamily="2" charset="0"/>
+                <a:ea typeface="Open Sans" pitchFamily="2" charset="0"/>
+                <a:cs typeface="Open Sans" pitchFamily="2" charset="0"/>
+              </a:rPr>
+              <a:t>Nếu ở bước 14 </a:t>
+            </a:r>
+          </a:p>
+          <a:p>
+            <a:pPr>
+              <a:buFont typeface="Wingdings" panose="05000000000000000000" pitchFamily="2" charset="2"/>
+              <a:buChar char="à"/>
+            </a:pPr>
+            <a:r>
+              <a:rPr lang="en-US" sz="2800">
+                <a:latin typeface="Open Sans" pitchFamily="2" charset="0"/>
+                <a:ea typeface="Open Sans" pitchFamily="2" charset="0"/>
+                <a:cs typeface="Open Sans" pitchFamily="2" charset="0"/>
+                <a:sym typeface="Wingdings" panose="05000000000000000000" pitchFamily="2" charset="2"/>
+              </a:rPr>
+              <a:t>K</a:t>
+            </a:r>
+            <a:r>
+              <a:rPr lang="en-US" sz="2800">
+                <a:latin typeface="Open Sans" pitchFamily="2" charset="0"/>
+                <a:ea typeface="Open Sans" pitchFamily="2" charset="0"/>
+                <a:cs typeface="Open Sans" pitchFamily="2" charset="0"/>
+              </a:rPr>
+              <a:t>hi bấm Enter.</a:t>
+            </a:r>
+          </a:p>
+          <a:p>
+            <a:pPr>
+              <a:spcBef>
+                <a:spcPts val="1800"/>
+              </a:spcBef>
+              <a:buFont typeface="Wingdings" panose="05000000000000000000" pitchFamily="2" charset="2"/>
+              <a:buChar char="à"/>
+            </a:pPr>
+            <a:r>
+              <a:rPr lang="en-US" sz="2800">
+                <a:latin typeface="Open Sans" pitchFamily="2" charset="0"/>
+                <a:ea typeface="Open Sans" pitchFamily="2" charset="0"/>
+                <a:cs typeface="Open Sans" pitchFamily="2" charset="0"/>
+              </a:rPr>
+              <a:t>Mà bị thông báo “Author identity unknown” (không rõ danh tính tác giả).</a:t>
+            </a:r>
+          </a:p>
+          <a:p>
+            <a:pPr>
+              <a:spcBef>
+                <a:spcPts val="1800"/>
+              </a:spcBef>
+              <a:buFont typeface="Wingdings" panose="05000000000000000000" pitchFamily="2" charset="2"/>
+              <a:buChar char="à"/>
+            </a:pPr>
+            <a:r>
+              <a:rPr lang="en-US" sz="2800">
+                <a:latin typeface="Open Sans" pitchFamily="2" charset="0"/>
+                <a:ea typeface="Open Sans" pitchFamily="2" charset="0"/>
+                <a:cs typeface="Open Sans" pitchFamily="2" charset="0"/>
+              </a:rPr>
+              <a:t>Thế thì việc bây giờ phải làm là cho nó biết danh tính của mình là xong.</a:t>
+            </a:r>
+          </a:p>
+        </p:txBody>
+      </p:sp>
+    </p:spTree>
+    <p:extLst>
+      <p:ext uri="{BB962C8B-B14F-4D97-AF65-F5344CB8AC3E}">
+        <p14:creationId xmlns:p14="http://schemas.microsoft.com/office/powerpoint/2010/main" val="4160710409"/>
+      </p:ext>
+    </p:extLst>
+  </p:cSld>
+  <p:clrMapOvr>
+    <a:masterClrMapping/>
+  </p:clrMapOvr>
+</p:sld>
+</file>
+
+<file path=ppt/slides/slide21.xml><?xml version="1.0" encoding="utf-8"?>
+<p:sld xmlns:a="http://schemas.openxmlformats.org/drawingml/2006/main" xmlns:r="http://schemas.openxmlformats.org/officeDocument/2006/relationships" xmlns:p="http://schemas.openxmlformats.org/presentationml/2006/main">
+  <p:cSld>
+    <p:spTree>
+      <p:nvGrpSpPr>
+        <p:cNvPr id="1" name=""/>
+        <p:cNvGrpSpPr/>
+        <p:nvPr/>
+      </p:nvGrpSpPr>
+      <p:grpSpPr>
+        <a:xfrm>
+          <a:off x="0" y="0"/>
+          <a:ext cx="0" cy="0"/>
+          <a:chOff x="0" y="0"/>
+          <a:chExt cx="0" cy="0"/>
+        </a:xfrm>
+      </p:grpSpPr>
+      <p:sp>
+        <p:nvSpPr>
+          <p:cNvPr id="2" name="Title 1">
+            <a:extLst>
+              <a:ext uri="{FF2B5EF4-FFF2-40B4-BE49-F238E27FC236}">
+                <a16:creationId xmlns:a16="http://schemas.microsoft.com/office/drawing/2014/main" id="{796ACF0C-55FA-5B7A-0AAD-B999FAA6FDFB}"/>
+              </a:ext>
+            </a:extLst>
+          </p:cNvPr>
+          <p:cNvSpPr>
+            <a:spLocks noGrp="1"/>
+          </p:cNvSpPr>
+          <p:nvPr>
+            <p:ph type="title"/>
+          </p:nvPr>
+        </p:nvSpPr>
+        <p:spPr/>
+        <p:txBody>
+          <a:bodyPr/>
+          <a:lstStyle/>
+          <a:p>
+            <a:pPr algn="l"/>
+            <a:r>
+              <a:rPr lang="vi-VN" b="1">
+                <a:latin typeface="Open Sans" pitchFamily="2" charset="0"/>
+                <a:ea typeface="Open Sans" pitchFamily="2" charset="0"/>
+                <a:cs typeface="Open Sans" pitchFamily="2" charset="0"/>
+              </a:rPr>
+              <a:t>Bướ</a:t>
+            </a:r>
+            <a:r>
+              <a:rPr lang="en-US" b="1">
+                <a:latin typeface="Open Sans" pitchFamily="2" charset="0"/>
+                <a:ea typeface="Open Sans" pitchFamily="2" charset="0"/>
+                <a:cs typeface="Open Sans" pitchFamily="2" charset="0"/>
+              </a:rPr>
+              <a:t>c 14.5:</a:t>
+            </a:r>
+            <a:endParaRPr lang="vi-VN" b="1">
+              <a:latin typeface="Open Sans" pitchFamily="2" charset="0"/>
+              <a:ea typeface="Open Sans" pitchFamily="2" charset="0"/>
+              <a:cs typeface="Open Sans" pitchFamily="2" charset="0"/>
+            </a:endParaRPr>
+          </a:p>
+        </p:txBody>
+      </p:sp>
+      <p:sp>
+        <p:nvSpPr>
+          <p:cNvPr id="4" name="Content Placeholder 3">
+            <a:extLst>
+              <a:ext uri="{FF2B5EF4-FFF2-40B4-BE49-F238E27FC236}">
+                <a16:creationId xmlns:a16="http://schemas.microsoft.com/office/drawing/2014/main" id="{6BF57A7B-6BFA-2083-96CA-1020B8B5A568}"/>
+              </a:ext>
+            </a:extLst>
+          </p:cNvPr>
+          <p:cNvSpPr>
+            <a:spLocks noGrp="1"/>
+          </p:cNvSpPr>
+          <p:nvPr>
+            <p:ph idx="1"/>
+          </p:nvPr>
+        </p:nvSpPr>
+        <p:spPr>
+          <a:xfrm>
+            <a:off x="913795" y="2076449"/>
+            <a:ext cx="10353762" cy="4596493"/>
+          </a:xfrm>
+        </p:spPr>
+        <p:txBody>
+          <a:bodyPr>
+            <a:normAutofit fontScale="92500" lnSpcReduction="10000"/>
+          </a:bodyPr>
+          <a:lstStyle/>
+          <a:p>
+            <a:pPr marL="36900" indent="0">
+              <a:buNone/>
+            </a:pPr>
+            <a:r>
+              <a:rPr lang="en-US" sz="2800">
+                <a:latin typeface="Open Sans" pitchFamily="2" charset="0"/>
+                <a:ea typeface="Open Sans" pitchFamily="2" charset="0"/>
+                <a:cs typeface="Open Sans" pitchFamily="2" charset="0"/>
+              </a:rPr>
+              <a:t>Để cho nó biết danh tính của mình, thì gõ:</a:t>
+            </a:r>
+          </a:p>
+          <a:p>
+            <a:pPr marL="36900" indent="0">
+              <a:buNone/>
+            </a:pPr>
+            <a:r>
+              <a:rPr lang="en-US" sz="2800">
+                <a:latin typeface="Open Sans" pitchFamily="2" charset="0"/>
+                <a:ea typeface="Open Sans" pitchFamily="2" charset="0"/>
+                <a:cs typeface="Open Sans" pitchFamily="2" charset="0"/>
+              </a:rPr>
+              <a:t>git config --global user.email </a:t>
+            </a:r>
+            <a:r>
+              <a:rPr lang="en-US" sz="2800">
+                <a:latin typeface="Open Sans" pitchFamily="2" charset="0"/>
+                <a:ea typeface="Open Sans" pitchFamily="2" charset="0"/>
+                <a:cs typeface="Open Sans" pitchFamily="2" charset="0"/>
+                <a:hlinkClick r:id="rId2"/>
+              </a:rPr>
+              <a:t>conggaro@gmail.com</a:t>
+            </a:r>
+            <a:endParaRPr lang="en-US" sz="2800">
+              <a:latin typeface="Open Sans" pitchFamily="2" charset="0"/>
+              <a:ea typeface="Open Sans" pitchFamily="2" charset="0"/>
+              <a:cs typeface="Open Sans" pitchFamily="2" charset="0"/>
+            </a:endParaRPr>
+          </a:p>
+          <a:p>
+            <a:pPr>
+              <a:buFont typeface="Wingdings" panose="05000000000000000000" pitchFamily="2" charset="2"/>
+              <a:buChar char="à"/>
+            </a:pPr>
+            <a:r>
+              <a:rPr lang="en-US" sz="2800">
+                <a:latin typeface="Open Sans" pitchFamily="2" charset="0"/>
+                <a:ea typeface="Open Sans" pitchFamily="2" charset="0"/>
+                <a:cs typeface="Open Sans" pitchFamily="2" charset="0"/>
+                <a:sym typeface="Wingdings" panose="05000000000000000000" pitchFamily="2" charset="2"/>
+              </a:rPr>
+              <a:t>Bấm Enter.</a:t>
+            </a:r>
+          </a:p>
+          <a:p>
+            <a:pPr>
+              <a:buFont typeface="Wingdings" panose="05000000000000000000" pitchFamily="2" charset="2"/>
+              <a:buChar char="à"/>
+            </a:pPr>
+            <a:endParaRPr lang="en-US" sz="2800">
+              <a:latin typeface="Open Sans" pitchFamily="2" charset="0"/>
+              <a:ea typeface="Open Sans" pitchFamily="2" charset="0"/>
+              <a:cs typeface="Open Sans" pitchFamily="2" charset="0"/>
+              <a:sym typeface="Wingdings" panose="05000000000000000000" pitchFamily="2" charset="2"/>
+            </a:endParaRPr>
+          </a:p>
+          <a:p>
+            <a:pPr marL="36900" indent="0">
+              <a:buNone/>
+            </a:pPr>
+            <a:r>
+              <a:rPr lang="en-US" sz="2800">
+                <a:latin typeface="Open Sans" pitchFamily="2" charset="0"/>
+                <a:ea typeface="Open Sans" pitchFamily="2" charset="0"/>
+                <a:cs typeface="Open Sans" pitchFamily="2" charset="0"/>
+                <a:sym typeface="Wingdings" panose="05000000000000000000" pitchFamily="2" charset="2"/>
+              </a:rPr>
+              <a:t>Và gõ thêm:</a:t>
+            </a:r>
+          </a:p>
+          <a:p>
+            <a:pPr marL="36900" indent="0">
+              <a:buNone/>
+            </a:pPr>
+            <a:r>
+              <a:rPr lang="en-US" sz="2800">
+                <a:latin typeface="Open Sans" pitchFamily="2" charset="0"/>
+                <a:ea typeface="Open Sans" pitchFamily="2" charset="0"/>
+                <a:cs typeface="Open Sans" pitchFamily="2" charset="0"/>
+              </a:rPr>
+              <a:t>git config --global user.name conggaro</a:t>
+            </a:r>
+          </a:p>
+          <a:p>
+            <a:pPr>
+              <a:buFont typeface="Wingdings" panose="05000000000000000000" pitchFamily="2" charset="2"/>
+              <a:buChar char="à"/>
+            </a:pPr>
+            <a:r>
+              <a:rPr lang="en-US" sz="2800">
+                <a:latin typeface="Open Sans" pitchFamily="2" charset="0"/>
+                <a:ea typeface="Open Sans" pitchFamily="2" charset="0"/>
+                <a:cs typeface="Open Sans" pitchFamily="2" charset="0"/>
+                <a:sym typeface="Wingdings" panose="05000000000000000000" pitchFamily="2" charset="2"/>
+              </a:rPr>
+              <a:t>Bấm Enter.</a:t>
+            </a:r>
+          </a:p>
+          <a:p>
+            <a:pPr marL="36900" indent="0">
+              <a:buNone/>
+            </a:pPr>
+            <a:endParaRPr lang="en-US" sz="2800">
+              <a:latin typeface="Open Sans" pitchFamily="2" charset="0"/>
+              <a:ea typeface="Open Sans" pitchFamily="2" charset="0"/>
+              <a:cs typeface="Open Sans" pitchFamily="2" charset="0"/>
+            </a:endParaRPr>
+          </a:p>
+          <a:p>
+            <a:pPr marL="36900" indent="0">
+              <a:buNone/>
+            </a:pPr>
+            <a:r>
+              <a:rPr lang="en-US" sz="2800" b="1">
+                <a:solidFill>
+                  <a:srgbClr val="FFFF00"/>
+                </a:solidFill>
+                <a:latin typeface="Open Sans" pitchFamily="2" charset="0"/>
+                <a:ea typeface="Open Sans" pitchFamily="2" charset="0"/>
+                <a:cs typeface="Open Sans" pitchFamily="2" charset="0"/>
+              </a:rPr>
+              <a:t>Thế là cho nó biết danh tính thành công.</a:t>
+            </a:r>
+          </a:p>
+        </p:txBody>
+      </p:sp>
+    </p:spTree>
+    <p:extLst>
+      <p:ext uri="{BB962C8B-B14F-4D97-AF65-F5344CB8AC3E}">
+        <p14:creationId xmlns:p14="http://schemas.microsoft.com/office/powerpoint/2010/main" val="3058747272"/>
+      </p:ext>
+    </p:extLst>
+  </p:cSld>
+  <p:clrMapOvr>
+    <a:masterClrMapping/>
+  </p:clrMapOvr>
+</p:sld>
+</file>
+
+<file path=ppt/slides/slide22.xml><?xml version="1.0" encoding="utf-8"?>
+<p:sld xmlns:a="http://schemas.openxmlformats.org/drawingml/2006/main" xmlns:r="http://schemas.openxmlformats.org/officeDocument/2006/relationships" xmlns:p="http://schemas.openxmlformats.org/presentationml/2006/main">
+  <p:cSld>
+    <p:spTree>
+      <p:nvGrpSpPr>
+        <p:cNvPr id="1" name=""/>
+        <p:cNvGrpSpPr/>
+        <p:nvPr/>
+      </p:nvGrpSpPr>
+      <p:grpSpPr>
+        <a:xfrm>
+          <a:off x="0" y="0"/>
+          <a:ext cx="0" cy="0"/>
+          <a:chOff x="0" y="0"/>
+          <a:chExt cx="0" cy="0"/>
+        </a:xfrm>
+      </p:grpSpPr>
+      <p:sp>
+        <p:nvSpPr>
+          <p:cNvPr id="2" name="Title 1">
+            <a:extLst>
+              <a:ext uri="{FF2B5EF4-FFF2-40B4-BE49-F238E27FC236}">
+                <a16:creationId xmlns:a16="http://schemas.microsoft.com/office/drawing/2014/main" id="{796ACF0C-55FA-5B7A-0AAD-B999FAA6FDFB}"/>
+              </a:ext>
+            </a:extLst>
+          </p:cNvPr>
+          <p:cNvSpPr>
+            <a:spLocks noGrp="1"/>
+          </p:cNvSpPr>
+          <p:nvPr>
+            <p:ph type="title"/>
+          </p:nvPr>
+        </p:nvSpPr>
+        <p:spPr/>
+        <p:txBody>
+          <a:bodyPr/>
+          <a:lstStyle/>
+          <a:p>
+            <a:pPr algn="l"/>
+            <a:r>
+              <a:rPr lang="vi-VN" b="1">
+                <a:latin typeface="Open Sans" pitchFamily="2" charset="0"/>
+                <a:ea typeface="Open Sans" pitchFamily="2" charset="0"/>
+                <a:cs typeface="Open Sans" pitchFamily="2" charset="0"/>
+              </a:rPr>
+              <a:t>Bướ</a:t>
+            </a:r>
+            <a:r>
+              <a:rPr lang="en-US" b="1">
+                <a:latin typeface="Open Sans" pitchFamily="2" charset="0"/>
+                <a:ea typeface="Open Sans" pitchFamily="2" charset="0"/>
+                <a:cs typeface="Open Sans" pitchFamily="2" charset="0"/>
+              </a:rPr>
+              <a:t>c 14.5:</a:t>
+            </a:r>
+            <a:endParaRPr lang="vi-VN" b="1">
+              <a:latin typeface="Open Sans" pitchFamily="2" charset="0"/>
+              <a:ea typeface="Open Sans" pitchFamily="2" charset="0"/>
+              <a:cs typeface="Open Sans" pitchFamily="2" charset="0"/>
+            </a:endParaRPr>
+          </a:p>
+        </p:txBody>
+      </p:sp>
+      <p:sp>
+        <p:nvSpPr>
+          <p:cNvPr id="4" name="Content Placeholder 3">
+            <a:extLst>
+              <a:ext uri="{FF2B5EF4-FFF2-40B4-BE49-F238E27FC236}">
+                <a16:creationId xmlns:a16="http://schemas.microsoft.com/office/drawing/2014/main" id="{6BF57A7B-6BFA-2083-96CA-1020B8B5A568}"/>
+              </a:ext>
+            </a:extLst>
+          </p:cNvPr>
+          <p:cNvSpPr>
+            <a:spLocks noGrp="1"/>
+          </p:cNvSpPr>
+          <p:nvPr>
+            <p:ph idx="1"/>
+          </p:nvPr>
+        </p:nvSpPr>
+        <p:spPr>
+          <a:xfrm>
+            <a:off x="913795" y="2076449"/>
+            <a:ext cx="10353762" cy="4596493"/>
+          </a:xfrm>
+        </p:spPr>
+        <p:txBody>
+          <a:bodyPr>
+            <a:normAutofit/>
+          </a:bodyPr>
+          <a:lstStyle/>
+          <a:p>
+            <a:pPr marL="36900" indent="0">
+              <a:buNone/>
+            </a:pPr>
+            <a:r>
+              <a:rPr lang="en-US" sz="2800">
+                <a:solidFill>
+                  <a:schemeClr val="tx1"/>
+                </a:solidFill>
+                <a:latin typeface="Open Sans" pitchFamily="2" charset="0"/>
+                <a:ea typeface="Open Sans" pitchFamily="2" charset="0"/>
+                <a:cs typeface="Open Sans" pitchFamily="2" charset="0"/>
+              </a:rPr>
+              <a:t>Biết được danh tính rồi</a:t>
+            </a:r>
+          </a:p>
+          <a:p>
+            <a:pPr marL="36900" indent="0">
+              <a:buNone/>
+            </a:pPr>
+            <a:r>
+              <a:rPr lang="en-US" sz="2800">
+                <a:solidFill>
+                  <a:schemeClr val="tx1"/>
+                </a:solidFill>
+                <a:latin typeface="Open Sans" pitchFamily="2" charset="0"/>
+                <a:ea typeface="Open Sans" pitchFamily="2" charset="0"/>
+                <a:cs typeface="Open Sans" pitchFamily="2" charset="0"/>
+                <a:sym typeface="Wingdings" panose="05000000000000000000" pitchFamily="2" charset="2"/>
+              </a:rPr>
+              <a:t> Thì gõ lại code như bước 14.</a:t>
+            </a:r>
+            <a:endParaRPr lang="en-US" sz="2800">
+              <a:solidFill>
+                <a:schemeClr val="tx1"/>
+              </a:solidFill>
+              <a:latin typeface="Open Sans" pitchFamily="2" charset="0"/>
+              <a:ea typeface="Open Sans" pitchFamily="2" charset="0"/>
+              <a:cs typeface="Open Sans" pitchFamily="2" charset="0"/>
+            </a:endParaRPr>
+          </a:p>
+        </p:txBody>
+      </p:sp>
+    </p:spTree>
+    <p:extLst>
+      <p:ext uri="{BB962C8B-B14F-4D97-AF65-F5344CB8AC3E}">
+        <p14:creationId xmlns:p14="http://schemas.microsoft.com/office/powerpoint/2010/main" val="4109226314"/>
+      </p:ext>
+    </p:extLst>
+  </p:cSld>
+  <p:clrMapOvr>
+    <a:masterClrMapping/>
+  </p:clrMapOvr>
+</p:sld>
+</file>
+
+<file path=ppt/slides/slide23.xml><?xml version="1.0" encoding="utf-8"?>
+<p:sld xmlns:a="http://schemas.openxmlformats.org/drawingml/2006/main" xmlns:r="http://schemas.openxmlformats.org/officeDocument/2006/relationships" xmlns:p="http://schemas.openxmlformats.org/presentationml/2006/main">
+  <p:cSld>
+    <p:spTree>
+      <p:nvGrpSpPr>
+        <p:cNvPr id="1" name=""/>
+        <p:cNvGrpSpPr/>
+        <p:nvPr/>
+      </p:nvGrpSpPr>
+      <p:grpSpPr>
+        <a:xfrm>
+          <a:off x="0" y="0"/>
+          <a:ext cx="0" cy="0"/>
+          <a:chOff x="0" y="0"/>
+          <a:chExt cx="0" cy="0"/>
+        </a:xfrm>
+      </p:grpSpPr>
+      <p:sp>
+        <p:nvSpPr>
+          <p:cNvPr id="2" name="Title 1">
+            <a:extLst>
+              <a:ext uri="{FF2B5EF4-FFF2-40B4-BE49-F238E27FC236}">
+                <a16:creationId xmlns:a16="http://schemas.microsoft.com/office/drawing/2014/main" id="{796ACF0C-55FA-5B7A-0AAD-B999FAA6FDFB}"/>
+              </a:ext>
+            </a:extLst>
+          </p:cNvPr>
+          <p:cNvSpPr>
+            <a:spLocks noGrp="1"/>
+          </p:cNvSpPr>
+          <p:nvPr>
+            <p:ph type="title"/>
+          </p:nvPr>
+        </p:nvSpPr>
+        <p:spPr/>
+        <p:txBody>
+          <a:bodyPr/>
+          <a:lstStyle/>
+          <a:p>
+            <a:pPr algn="l"/>
+            <a:r>
+              <a:rPr lang="vi-VN" b="1">
+                <a:latin typeface="Open Sans" pitchFamily="2" charset="0"/>
+                <a:ea typeface="Open Sans" pitchFamily="2" charset="0"/>
+                <a:cs typeface="Open Sans" pitchFamily="2" charset="0"/>
+              </a:rPr>
+              <a:t>Bướ</a:t>
+            </a:r>
+            <a:r>
+              <a:rPr lang="en-US" b="1">
+                <a:latin typeface="Open Sans" pitchFamily="2" charset="0"/>
+                <a:ea typeface="Open Sans" pitchFamily="2" charset="0"/>
+                <a:cs typeface="Open Sans" pitchFamily="2" charset="0"/>
+              </a:rPr>
+              <a:t>c 15:</a:t>
+            </a:r>
+            <a:endParaRPr lang="vi-VN" b="1">
+              <a:latin typeface="Open Sans" pitchFamily="2" charset="0"/>
+              <a:ea typeface="Open Sans" pitchFamily="2" charset="0"/>
+              <a:cs typeface="Open Sans" pitchFamily="2" charset="0"/>
+            </a:endParaRPr>
+          </a:p>
+        </p:txBody>
+      </p:sp>
+      <p:sp>
+        <p:nvSpPr>
+          <p:cNvPr id="4" name="Content Placeholder 3">
+            <a:extLst>
+              <a:ext uri="{FF2B5EF4-FFF2-40B4-BE49-F238E27FC236}">
+                <a16:creationId xmlns:a16="http://schemas.microsoft.com/office/drawing/2014/main" id="{6BF57A7B-6BFA-2083-96CA-1020B8B5A568}"/>
+              </a:ext>
+            </a:extLst>
+          </p:cNvPr>
+          <p:cNvSpPr>
+            <a:spLocks noGrp="1"/>
+          </p:cNvSpPr>
+          <p:nvPr>
+            <p:ph idx="1"/>
+          </p:nvPr>
+        </p:nvSpPr>
+        <p:spPr/>
+        <p:txBody>
+          <a:bodyPr>
+            <a:normAutofit/>
+          </a:bodyPr>
+          <a:lstStyle/>
+          <a:p>
+            <a:pPr marL="36900" indent="0">
+              <a:buNone/>
+            </a:pPr>
+            <a:r>
+              <a:rPr lang="en-US" sz="2800">
+                <a:latin typeface="Open Sans" pitchFamily="2" charset="0"/>
+                <a:ea typeface="Open Sans" pitchFamily="2" charset="0"/>
+                <a:cs typeface="Open Sans" pitchFamily="2" charset="0"/>
+              </a:rPr>
+              <a:t>gõ git push</a:t>
+            </a:r>
+          </a:p>
+          <a:p>
+            <a:pPr marL="36900" indent="0">
+              <a:buNone/>
+            </a:pPr>
+            <a:r>
+              <a:rPr lang="en-US" sz="2800">
+                <a:latin typeface="Open Sans" pitchFamily="2" charset="0"/>
+                <a:ea typeface="Open Sans" pitchFamily="2" charset="0"/>
+                <a:cs typeface="Open Sans" pitchFamily="2" charset="0"/>
+                <a:sym typeface="Wingdings" panose="05000000000000000000" pitchFamily="2" charset="2"/>
+              </a:rPr>
+              <a:t> Bấm Enter.</a:t>
+            </a:r>
+          </a:p>
+          <a:p>
+            <a:pPr marL="36900" indent="0">
+              <a:buNone/>
+            </a:pPr>
+            <a:endParaRPr lang="en-US" sz="2800">
+              <a:latin typeface="Open Sans" pitchFamily="2" charset="0"/>
+              <a:ea typeface="Open Sans" pitchFamily="2" charset="0"/>
+              <a:cs typeface="Open Sans" pitchFamily="2" charset="0"/>
+            </a:endParaRPr>
+          </a:p>
+          <a:p>
+            <a:pPr marL="36900" indent="0">
+              <a:buNone/>
+            </a:pPr>
+            <a:r>
+              <a:rPr lang="en-US" sz="2800">
+                <a:latin typeface="Open Sans" pitchFamily="2" charset="0"/>
+                <a:ea typeface="Open Sans" pitchFamily="2" charset="0"/>
+                <a:cs typeface="Open Sans" pitchFamily="2" charset="0"/>
+              </a:rPr>
+              <a:t>Nếu là lần đầu tiên dùng Git thì nó bắt đăng nhập lại bằng tài khoản GitHub.</a:t>
+            </a:r>
+          </a:p>
+        </p:txBody>
+      </p:sp>
+    </p:spTree>
+    <p:extLst>
+      <p:ext uri="{BB962C8B-B14F-4D97-AF65-F5344CB8AC3E}">
+        <p14:creationId xmlns:p14="http://schemas.microsoft.com/office/powerpoint/2010/main" val="1470272621"/>
+      </p:ext>
+    </p:extLst>
+  </p:cSld>
+  <p:clrMapOvr>
+    <a:masterClrMapping/>
+  </p:clrMapOvr>
+</p:sld>
+</file>
+
+<file path=ppt/slides/slide24.xml><?xml version="1.0" encoding="utf-8"?>
+<p:sld xmlns:a="http://schemas.openxmlformats.org/drawingml/2006/main" xmlns:r="http://schemas.openxmlformats.org/officeDocument/2006/relationships" xmlns:p="http://schemas.openxmlformats.org/presentationml/2006/main">
+  <p:cSld>
+    <p:spTree>
+      <p:nvGrpSpPr>
+        <p:cNvPr id="1" name=""/>
+        <p:cNvGrpSpPr/>
+        <p:nvPr/>
+      </p:nvGrpSpPr>
+      <p:grpSpPr>
+        <a:xfrm>
+          <a:off x="0" y="0"/>
+          <a:ext cx="0" cy="0"/>
+          <a:chOff x="0" y="0"/>
+          <a:chExt cx="0" cy="0"/>
+        </a:xfrm>
+      </p:grpSpPr>
+      <p:sp>
+        <p:nvSpPr>
+          <p:cNvPr id="2" name="Title 1">
+            <a:extLst>
+              <a:ext uri="{FF2B5EF4-FFF2-40B4-BE49-F238E27FC236}">
+                <a16:creationId xmlns:a16="http://schemas.microsoft.com/office/drawing/2014/main" id="{796ACF0C-55FA-5B7A-0AAD-B999FAA6FDFB}"/>
+              </a:ext>
+            </a:extLst>
+          </p:cNvPr>
+          <p:cNvSpPr>
+            <a:spLocks noGrp="1"/>
+          </p:cNvSpPr>
+          <p:nvPr>
+            <p:ph type="title"/>
+          </p:nvPr>
+        </p:nvSpPr>
+        <p:spPr/>
+        <p:txBody>
+          <a:bodyPr/>
+          <a:lstStyle/>
+          <a:p>
+            <a:pPr algn="l"/>
+            <a:r>
+              <a:rPr lang="vi-VN" b="1">
+                <a:latin typeface="Open Sans" pitchFamily="2" charset="0"/>
+                <a:ea typeface="Open Sans" pitchFamily="2" charset="0"/>
+                <a:cs typeface="Open Sans" pitchFamily="2" charset="0"/>
+              </a:rPr>
+              <a:t>Bướ</a:t>
+            </a:r>
+            <a:r>
+              <a:rPr lang="en-US" b="1">
+                <a:latin typeface="Open Sans" pitchFamily="2" charset="0"/>
+                <a:ea typeface="Open Sans" pitchFamily="2" charset="0"/>
+                <a:cs typeface="Open Sans" pitchFamily="2" charset="0"/>
+              </a:rPr>
+              <a:t>c 16:</a:t>
+            </a:r>
+            <a:endParaRPr lang="vi-VN" b="1">
+              <a:latin typeface="Open Sans" pitchFamily="2" charset="0"/>
+              <a:ea typeface="Open Sans" pitchFamily="2" charset="0"/>
+              <a:cs typeface="Open Sans" pitchFamily="2" charset="0"/>
+            </a:endParaRPr>
+          </a:p>
+        </p:txBody>
+      </p:sp>
+      <p:pic>
+        <p:nvPicPr>
+          <p:cNvPr id="5" name="Content Placeholder 4">
+            <a:extLst>
+              <a:ext uri="{FF2B5EF4-FFF2-40B4-BE49-F238E27FC236}">
+                <a16:creationId xmlns:a16="http://schemas.microsoft.com/office/drawing/2014/main" id="{8EE9D4C0-250E-D6D8-88EA-DFAFCD6A355B}"/>
+              </a:ext>
+            </a:extLst>
+          </p:cNvPr>
+          <p:cNvPicPr>
+            <a:picLocks noGrp="1" noChangeAspect="1"/>
+          </p:cNvPicPr>
+          <p:nvPr>
+            <p:ph idx="1"/>
+          </p:nvPr>
+        </p:nvPicPr>
+        <p:blipFill>
+          <a:blip r:embed="rId2"/>
+          <a:stretch>
+            <a:fillRect/>
+          </a:stretch>
+        </p:blipFill>
+        <p:spPr>
+          <a:xfrm>
+            <a:off x="2663623" y="1646464"/>
+            <a:ext cx="6864754" cy="4171950"/>
+          </a:xfrm>
+        </p:spPr>
+      </p:pic>
+      <p:sp>
+        <p:nvSpPr>
+          <p:cNvPr id="6" name="TextBox 5">
+            <a:extLst>
+              <a:ext uri="{FF2B5EF4-FFF2-40B4-BE49-F238E27FC236}">
+                <a16:creationId xmlns:a16="http://schemas.microsoft.com/office/drawing/2014/main" id="{622C70FA-E388-7F8F-B87D-6244D5C902FA}"/>
+              </a:ext>
+            </a:extLst>
+          </p:cNvPr>
+          <p:cNvSpPr txBox="1"/>
+          <p:nvPr/>
+        </p:nvSpPr>
+        <p:spPr>
+          <a:xfrm>
+            <a:off x="2079172" y="5941758"/>
+            <a:ext cx="8033657" cy="830997"/>
+          </a:xfrm>
+          <a:prstGeom prst="rect">
+            <a:avLst/>
+          </a:prstGeom>
+          <a:noFill/>
+        </p:spPr>
+        <p:txBody>
+          <a:bodyPr wrap="square" rtlCol="0">
+            <a:spAutoFit/>
+          </a:bodyPr>
+          <a:lstStyle/>
+          <a:p>
+            <a:pPr algn="ctr"/>
+            <a:r>
+              <a:rPr lang="en-US" sz="2400">
+                <a:latin typeface="Open Sans" pitchFamily="2" charset="0"/>
+                <a:ea typeface="Open Sans" pitchFamily="2" charset="0"/>
+                <a:cs typeface="Open Sans" pitchFamily="2" charset="0"/>
+              </a:rPr>
+              <a:t>Nó cứ hiện done như vậy </a:t>
+            </a:r>
+          </a:p>
+          <a:p>
+            <a:pPr algn="ctr"/>
+            <a:r>
+              <a:rPr lang="en-US" sz="2400">
+                <a:latin typeface="Open Sans" pitchFamily="2" charset="0"/>
+                <a:ea typeface="Open Sans" pitchFamily="2" charset="0"/>
+                <a:cs typeface="Open Sans" pitchFamily="2" charset="0"/>
+                <a:sym typeface="Wingdings" panose="05000000000000000000" pitchFamily="2" charset="2"/>
+              </a:rPr>
+              <a:t> Là gửi code thành công lên GitHub rồi đó.</a:t>
+            </a:r>
+            <a:endParaRPr lang="vi-VN" sz="2400">
+              <a:latin typeface="Open Sans" pitchFamily="2" charset="0"/>
+              <a:ea typeface="Open Sans" pitchFamily="2" charset="0"/>
+              <a:cs typeface="Open Sans" pitchFamily="2" charset="0"/>
+            </a:endParaRPr>
+          </a:p>
+        </p:txBody>
+      </p:sp>
+    </p:spTree>
+    <p:extLst>
+      <p:ext uri="{BB962C8B-B14F-4D97-AF65-F5344CB8AC3E}">
+        <p14:creationId xmlns:p14="http://schemas.microsoft.com/office/powerpoint/2010/main" val="2247629520"/>
+      </p:ext>
+    </p:extLst>
+  </p:cSld>
+  <p:clrMapOvr>
+    <a:masterClrMapping/>
+  </p:clrMapOvr>
+</p:sld>
+</file>
+
+<file path=ppt/slides/slide25.xml><?xml version="1.0" encoding="utf-8"?>
+<p:sld xmlns:a="http://schemas.openxmlformats.org/drawingml/2006/main" xmlns:r="http://schemas.openxmlformats.org/officeDocument/2006/relationships" xmlns:p="http://schemas.openxmlformats.org/presentationml/2006/main">
+  <p:cSld>
+    <p:spTree>
+      <p:nvGrpSpPr>
+        <p:cNvPr id="1" name=""/>
+        <p:cNvGrpSpPr/>
+        <p:nvPr/>
+      </p:nvGrpSpPr>
+      <p:grpSpPr>
+        <a:xfrm>
+          <a:off x="0" y="0"/>
+          <a:ext cx="0" cy="0"/>
+          <a:chOff x="0" y="0"/>
+          <a:chExt cx="0" cy="0"/>
+        </a:xfrm>
+      </p:grpSpPr>
+      <p:sp>
+        <p:nvSpPr>
+          <p:cNvPr id="2" name="Title 1">
+            <a:extLst>
+              <a:ext uri="{FF2B5EF4-FFF2-40B4-BE49-F238E27FC236}">
+                <a16:creationId xmlns:a16="http://schemas.microsoft.com/office/drawing/2014/main" id="{796ACF0C-55FA-5B7A-0AAD-B999FAA6FDFB}"/>
+              </a:ext>
+            </a:extLst>
+          </p:cNvPr>
+          <p:cNvSpPr>
+            <a:spLocks noGrp="1"/>
+          </p:cNvSpPr>
+          <p:nvPr>
+            <p:ph type="title"/>
+          </p:nvPr>
+        </p:nvSpPr>
+        <p:spPr/>
+        <p:txBody>
+          <a:bodyPr/>
+          <a:lstStyle/>
+          <a:p>
+            <a:pPr algn="l"/>
+            <a:r>
+              <a:rPr lang="vi-VN" b="1">
+                <a:latin typeface="Open Sans" pitchFamily="2" charset="0"/>
+                <a:ea typeface="Open Sans" pitchFamily="2" charset="0"/>
+                <a:cs typeface="Open Sans" pitchFamily="2" charset="0"/>
+              </a:rPr>
+              <a:t>Bướ</a:t>
+            </a:r>
+            <a:r>
+              <a:rPr lang="en-US" b="1">
+                <a:latin typeface="Open Sans" pitchFamily="2" charset="0"/>
+                <a:ea typeface="Open Sans" pitchFamily="2" charset="0"/>
+                <a:cs typeface="Open Sans" pitchFamily="2" charset="0"/>
+              </a:rPr>
+              <a:t>c 17:</a:t>
+            </a:r>
+            <a:endParaRPr lang="vi-VN" b="1">
+              <a:latin typeface="Open Sans" pitchFamily="2" charset="0"/>
+              <a:ea typeface="Open Sans" pitchFamily="2" charset="0"/>
+              <a:cs typeface="Open Sans" pitchFamily="2" charset="0"/>
+            </a:endParaRPr>
+          </a:p>
+        </p:txBody>
+      </p:sp>
+      <p:sp>
+        <p:nvSpPr>
+          <p:cNvPr id="6" name="TextBox 5">
+            <a:extLst>
+              <a:ext uri="{FF2B5EF4-FFF2-40B4-BE49-F238E27FC236}">
+                <a16:creationId xmlns:a16="http://schemas.microsoft.com/office/drawing/2014/main" id="{622C70FA-E388-7F8F-B87D-6244D5C902FA}"/>
+              </a:ext>
+            </a:extLst>
+          </p:cNvPr>
+          <p:cNvSpPr txBox="1"/>
+          <p:nvPr/>
+        </p:nvSpPr>
+        <p:spPr>
+          <a:xfrm>
+            <a:off x="2079172" y="5941758"/>
+            <a:ext cx="8033657" cy="461665"/>
+          </a:xfrm>
+          <a:prstGeom prst="rect">
+            <a:avLst/>
+          </a:prstGeom>
+          <a:noFill/>
+        </p:spPr>
+        <p:txBody>
+          <a:bodyPr wrap="square" rtlCol="0">
+            <a:spAutoFit/>
+          </a:bodyPr>
+          <a:lstStyle/>
+          <a:p>
+            <a:pPr algn="ctr"/>
+            <a:r>
+              <a:rPr lang="en-US" sz="2400">
+                <a:latin typeface="Open Sans" pitchFamily="2" charset="0"/>
+                <a:ea typeface="Open Sans" pitchFamily="2" charset="0"/>
+                <a:cs typeface="Open Sans" pitchFamily="2" charset="0"/>
+              </a:rPr>
+              <a:t>Mở GitHub trên trình duyệt để xem kết quả thôi</a:t>
+            </a:r>
+          </a:p>
+        </p:txBody>
+      </p:sp>
+      <p:pic>
+        <p:nvPicPr>
+          <p:cNvPr id="8" name="Content Placeholder 7">
+            <a:extLst>
+              <a:ext uri="{FF2B5EF4-FFF2-40B4-BE49-F238E27FC236}">
+                <a16:creationId xmlns:a16="http://schemas.microsoft.com/office/drawing/2014/main" id="{EFBE0DDF-AED9-923E-03D4-46725E1D43E8}"/>
+              </a:ext>
+            </a:extLst>
+          </p:cNvPr>
+          <p:cNvPicPr>
+            <a:picLocks noGrp="1" noChangeAspect="1"/>
+          </p:cNvPicPr>
+          <p:nvPr>
+            <p:ph idx="1"/>
+          </p:nvPr>
+        </p:nvPicPr>
+        <p:blipFill>
+          <a:blip r:embed="rId2"/>
+          <a:stretch>
+            <a:fillRect/>
+          </a:stretch>
+        </p:blipFill>
+        <p:spPr>
+          <a:xfrm>
+            <a:off x="2586604" y="1717221"/>
+            <a:ext cx="7018792" cy="3948071"/>
+          </a:xfrm>
+          <a:prstGeom prst="rect">
+            <a:avLst/>
+          </a:prstGeom>
+          <a:ln w="28575" cap="sq">
+            <a:solidFill>
+              <a:srgbClr val="00B050"/>
+            </a:solidFill>
+            <a:miter lim="800000"/>
+          </a:ln>
+          <a:effectLst>
+            <a:outerShdw blurRad="57150" dist="50800" dir="2700000" algn="tl" rotWithShape="0">
+              <a:srgbClr val="000000">
+                <a:alpha val="40000"/>
+              </a:srgbClr>
+            </a:outerShdw>
+          </a:effectLst>
+        </p:spPr>
+      </p:pic>
+      <p:sp>
+        <p:nvSpPr>
+          <p:cNvPr id="9" name="TextBox 8">
+            <a:extLst>
+              <a:ext uri="{FF2B5EF4-FFF2-40B4-BE49-F238E27FC236}">
+                <a16:creationId xmlns:a16="http://schemas.microsoft.com/office/drawing/2014/main" id="{9DB39DBE-DA3C-8E52-E029-1FF67E0CF9A4}"/>
+              </a:ext>
+            </a:extLst>
+          </p:cNvPr>
+          <p:cNvSpPr txBox="1"/>
+          <p:nvPr/>
+        </p:nvSpPr>
+        <p:spPr>
+          <a:xfrm>
+            <a:off x="10112828" y="2032000"/>
+            <a:ext cx="1672809" cy="1200329"/>
+          </a:xfrm>
+          <a:prstGeom prst="rect">
+            <a:avLst/>
+          </a:prstGeom>
+          <a:noFill/>
+        </p:spPr>
+        <p:txBody>
+          <a:bodyPr wrap="square" rtlCol="0">
+            <a:spAutoFit/>
+          </a:bodyPr>
+          <a:lstStyle/>
+          <a:p>
+            <a:r>
+              <a:rPr lang="en-US">
+                <a:latin typeface="Open Sans" pitchFamily="2" charset="0"/>
+                <a:ea typeface="Open Sans" pitchFamily="2" charset="0"/>
+                <a:cs typeface="Open Sans" pitchFamily="2" charset="0"/>
+              </a:rPr>
+              <a:t>Như này là thành công gửi file lên Github rồi đó.</a:t>
+            </a:r>
+            <a:endParaRPr lang="vi-VN">
+              <a:latin typeface="Open Sans" pitchFamily="2" charset="0"/>
+              <a:ea typeface="Open Sans" pitchFamily="2" charset="0"/>
+              <a:cs typeface="Open Sans" pitchFamily="2" charset="0"/>
+            </a:endParaRPr>
+          </a:p>
+        </p:txBody>
+      </p:sp>
+      <p:sp>
+        <p:nvSpPr>
+          <p:cNvPr id="10" name="Arrow: Down 9">
+            <a:extLst>
+              <a:ext uri="{FF2B5EF4-FFF2-40B4-BE49-F238E27FC236}">
+                <a16:creationId xmlns:a16="http://schemas.microsoft.com/office/drawing/2014/main" id="{FFF797E7-E3E9-DEE3-0267-93FA6BF94242}"/>
+              </a:ext>
+            </a:extLst>
+          </p:cNvPr>
+          <p:cNvSpPr/>
+          <p:nvPr/>
+        </p:nvSpPr>
+        <p:spPr>
+          <a:xfrm rot="4778044">
+            <a:off x="7559121" y="609804"/>
+            <a:ext cx="299285" cy="4862420"/>
+          </a:xfrm>
+          <a:prstGeom prst="downArrow">
+            <a:avLst/>
+          </a:prstGeom>
+          <a:solidFill>
+            <a:srgbClr val="FF0000"/>
+          </a:solidFill>
+          <a:ln>
+            <a:noFill/>
+          </a:ln>
+        </p:spPr>
+        <p:style>
+          <a:lnRef idx="2">
+            <a:schemeClr val="accent1">
+              <a:shade val="50000"/>
+            </a:schemeClr>
+          </a:lnRef>
+          <a:fillRef idx="1">
+            <a:schemeClr val="accent1"/>
+          </a:fillRef>
+          <a:effectRef idx="0">
+            <a:schemeClr val="accent1"/>
+          </a:effectRef>
+          <a:fontRef idx="minor">
+            <a:schemeClr val="lt1"/>
+          </a:fontRef>
+        </p:style>
+        <p:txBody>
+          <a:bodyPr rtlCol="0" anchor="ctr"/>
+          <a:lstStyle/>
+          <a:p>
+            <a:pPr algn="ctr"/>
+            <a:endParaRPr lang="vi-VN"/>
+          </a:p>
+        </p:txBody>
+      </p:sp>
+    </p:spTree>
+    <p:extLst>
+      <p:ext uri="{BB962C8B-B14F-4D97-AF65-F5344CB8AC3E}">
+        <p14:creationId xmlns:p14="http://schemas.microsoft.com/office/powerpoint/2010/main" val="2781538849"/>
       </p:ext>
     </p:extLst>
   </p:cSld>

</xml_diff>